<commit_message>
Generating arbitary circle in 3D space and tracking it
</commit_message>
<xml_diff>
--- a/MECH639.pptx
+++ b/MECH639.pptx
@@ -6,9 +6,10 @@
   </p:sldMasterIdLst>
   <p:sldIdLst>
     <p:sldId id="256" r:id="rId2"/>
-    <p:sldId id="257" r:id="rId3"/>
-    <p:sldId id="258" r:id="rId4"/>
-    <p:sldId id="259" r:id="rId5"/>
+    <p:sldId id="260" r:id="rId3"/>
+    <p:sldId id="257" r:id="rId4"/>
+    <p:sldId id="258" r:id="rId5"/>
+    <p:sldId id="259" r:id="rId6"/>
   </p:sldIdLst>
   <p:sldSz cx="12192000" cy="6858000"/>
   <p:notesSz cx="6858000" cy="9144000"/>
@@ -107,6 +108,11 @@
       </a:defRPr>
     </a:lvl9pPr>
   </p:defaultTextStyle>
+  <p:extLst>
+    <p:ext uri="{EFAFB233-063F-42B5-8137-9DF3F51BA10A}">
+      <p15:sldGuideLst xmlns:p15="http://schemas.microsoft.com/office/powerpoint/2012/main"/>
+    </p:ext>
+  </p:extLst>
 </p:presentation>
 </file>
 
@@ -257,7 +263,7 @@
           <a:p>
             <a:fld id="{EE3423B0-5DE3-41C2-A103-9BE402E7367B}" type="datetimeFigureOut">
               <a:rPr lang="ko-KR" altLang="en-US" smtClean="0"/>
-              <a:t>2023-04-21</a:t>
+              <a:t>2023-04-24</a:t>
             </a:fld>
             <a:endParaRPr lang="ko-KR" altLang="en-US"/>
           </a:p>
@@ -455,7 +461,7 @@
           <a:p>
             <a:fld id="{EE3423B0-5DE3-41C2-A103-9BE402E7367B}" type="datetimeFigureOut">
               <a:rPr lang="ko-KR" altLang="en-US" smtClean="0"/>
-              <a:t>2023-04-21</a:t>
+              <a:t>2023-04-24</a:t>
             </a:fld>
             <a:endParaRPr lang="ko-KR" altLang="en-US"/>
           </a:p>
@@ -663,7 +669,7 @@
           <a:p>
             <a:fld id="{EE3423B0-5DE3-41C2-A103-9BE402E7367B}" type="datetimeFigureOut">
               <a:rPr lang="ko-KR" altLang="en-US" smtClean="0"/>
-              <a:t>2023-04-21</a:t>
+              <a:t>2023-04-24</a:t>
             </a:fld>
             <a:endParaRPr lang="ko-KR" altLang="en-US"/>
           </a:p>
@@ -861,7 +867,7 @@
           <a:p>
             <a:fld id="{EE3423B0-5DE3-41C2-A103-9BE402E7367B}" type="datetimeFigureOut">
               <a:rPr lang="ko-KR" altLang="en-US" smtClean="0"/>
-              <a:t>2023-04-21</a:t>
+              <a:t>2023-04-24</a:t>
             </a:fld>
             <a:endParaRPr lang="ko-KR" altLang="en-US"/>
           </a:p>
@@ -1136,7 +1142,7 @@
           <a:p>
             <a:fld id="{EE3423B0-5DE3-41C2-A103-9BE402E7367B}" type="datetimeFigureOut">
               <a:rPr lang="ko-KR" altLang="en-US" smtClean="0"/>
-              <a:t>2023-04-21</a:t>
+              <a:t>2023-04-24</a:t>
             </a:fld>
             <a:endParaRPr lang="ko-KR" altLang="en-US"/>
           </a:p>
@@ -1401,7 +1407,7 @@
           <a:p>
             <a:fld id="{EE3423B0-5DE3-41C2-A103-9BE402E7367B}" type="datetimeFigureOut">
               <a:rPr lang="ko-KR" altLang="en-US" smtClean="0"/>
-              <a:t>2023-04-21</a:t>
+              <a:t>2023-04-24</a:t>
             </a:fld>
             <a:endParaRPr lang="ko-KR" altLang="en-US"/>
           </a:p>
@@ -1813,7 +1819,7 @@
           <a:p>
             <a:fld id="{EE3423B0-5DE3-41C2-A103-9BE402E7367B}" type="datetimeFigureOut">
               <a:rPr lang="ko-KR" altLang="en-US" smtClean="0"/>
-              <a:t>2023-04-21</a:t>
+              <a:t>2023-04-24</a:t>
             </a:fld>
             <a:endParaRPr lang="ko-KR" altLang="en-US"/>
           </a:p>
@@ -1954,7 +1960,7 @@
           <a:p>
             <a:fld id="{EE3423B0-5DE3-41C2-A103-9BE402E7367B}" type="datetimeFigureOut">
               <a:rPr lang="ko-KR" altLang="en-US" smtClean="0"/>
-              <a:t>2023-04-21</a:t>
+              <a:t>2023-04-24</a:t>
             </a:fld>
             <a:endParaRPr lang="ko-KR" altLang="en-US"/>
           </a:p>
@@ -2067,7 +2073,7 @@
           <a:p>
             <a:fld id="{EE3423B0-5DE3-41C2-A103-9BE402E7367B}" type="datetimeFigureOut">
               <a:rPr lang="ko-KR" altLang="en-US" smtClean="0"/>
-              <a:t>2023-04-21</a:t>
+              <a:t>2023-04-24</a:t>
             </a:fld>
             <a:endParaRPr lang="ko-KR" altLang="en-US"/>
           </a:p>
@@ -2378,7 +2384,7 @@
           <a:p>
             <a:fld id="{EE3423B0-5DE3-41C2-A103-9BE402E7367B}" type="datetimeFigureOut">
               <a:rPr lang="ko-KR" altLang="en-US" smtClean="0"/>
-              <a:t>2023-04-21</a:t>
+              <a:t>2023-04-24</a:t>
             </a:fld>
             <a:endParaRPr lang="ko-KR" altLang="en-US"/>
           </a:p>
@@ -2666,7 +2672,7 @@
           <a:p>
             <a:fld id="{EE3423B0-5DE3-41C2-A103-9BE402E7367B}" type="datetimeFigureOut">
               <a:rPr lang="ko-KR" altLang="en-US" smtClean="0"/>
-              <a:t>2023-04-21</a:t>
+              <a:t>2023-04-24</a:t>
             </a:fld>
             <a:endParaRPr lang="ko-KR" altLang="en-US"/>
           </a:p>
@@ -2907,7 +2913,7 @@
           <a:p>
             <a:fld id="{EE3423B0-5DE3-41C2-A103-9BE402E7367B}" type="datetimeFigureOut">
               <a:rPr lang="ko-KR" altLang="en-US" smtClean="0"/>
-              <a:t>2023-04-21</a:t>
+              <a:t>2023-04-24</a:t>
             </a:fld>
             <a:endParaRPr lang="ko-KR" altLang="en-US"/>
           </a:p>
@@ -3423,7 +3429,7 @@
           <p:cNvPr id="2" name="제목 1">
             <a:extLst>
               <a:ext uri="{FF2B5EF4-FFF2-40B4-BE49-F238E27FC236}">
-                <a16:creationId xmlns:a16="http://schemas.microsoft.com/office/drawing/2014/main" id="{D4291F4B-E067-D853-657D-7FA2D5D9D58A}"/>
+                <a16:creationId xmlns:a16="http://schemas.microsoft.com/office/drawing/2014/main" id="{A29B2DB4-D7C4-1C4B-340F-C6F8B5C8DCA2}"/>
               </a:ext>
             </a:extLst>
           </p:cNvPr>
@@ -3434,992 +3440,507 @@
             <p:ph type="title"/>
           </p:nvPr>
         </p:nvSpPr>
-        <p:spPr/>
-        <p:txBody>
-          <a:bodyPr/>
-          <a:lstStyle/>
-          <a:p>
-            <a:r>
-              <a:rPr lang="en-US" altLang="ko-KR" b="1" dirty="0"/>
-              <a:t>Configuration of IndyRP2</a:t>
-            </a:r>
-            <a:endParaRPr lang="ko-KR" altLang="en-US" b="1" dirty="0"/>
-          </a:p>
-        </p:txBody>
-      </p:sp>
-      <p:pic>
-        <p:nvPicPr>
-          <p:cNvPr id="7" name="그림 6">
-            <a:extLst>
-              <a:ext uri="{FF2B5EF4-FFF2-40B4-BE49-F238E27FC236}">
-                <a16:creationId xmlns:a16="http://schemas.microsoft.com/office/drawing/2014/main" id="{46617864-9F9E-080A-9FF6-7867150D90F6}"/>
-              </a:ext>
-            </a:extLst>
-          </p:cNvPr>
-          <p:cNvPicPr>
-            <a:picLocks noChangeAspect="1"/>
-          </p:cNvPicPr>
-          <p:nvPr/>
-        </p:nvPicPr>
-        <p:blipFill>
-          <a:blip r:embed="rId2"/>
-          <a:stretch>
-            <a:fillRect/>
-          </a:stretch>
-        </p:blipFill>
         <p:spPr>
           <a:xfrm>
-            <a:off x="234034" y="1514410"/>
-            <a:ext cx="2618223" cy="5192990"/>
+            <a:off x="0" y="0"/>
+            <a:ext cx="10515600" cy="1325563"/>
           </a:xfrm>
-          <a:prstGeom prst="rect">
-            <a:avLst/>
-          </a:prstGeom>
         </p:spPr>
-      </p:pic>
-      <p:sp>
-        <p:nvSpPr>
-          <p:cNvPr id="8" name="TextBox 7">
-            <a:extLst>
-              <a:ext uri="{FF2B5EF4-FFF2-40B4-BE49-F238E27FC236}">
-                <a16:creationId xmlns:a16="http://schemas.microsoft.com/office/drawing/2014/main" id="{E4CD7388-DD65-A02B-3D2B-2AF56C2514CB}"/>
-              </a:ext>
-            </a:extLst>
-          </p:cNvPr>
-          <p:cNvSpPr txBox="1"/>
-          <p:nvPr/>
+        <p:txBody>
+          <a:bodyPr/>
+          <a:lstStyle/>
+          <a:p>
+            <a:r>
+              <a:rPr lang="en-US" altLang="ko-KR" b="1" dirty="0"/>
+              <a:t>TO</a:t>
+            </a:r>
+            <a:r>
+              <a:rPr lang="ko-KR" altLang="en-US" b="1" dirty="0"/>
+              <a:t> </a:t>
+            </a:r>
+            <a:r>
+              <a:rPr lang="en-US" altLang="ko-KR" b="1" dirty="0"/>
+              <a:t>DO</a:t>
+            </a:r>
+            <a:endParaRPr lang="ko-KR" altLang="en-US" b="1" dirty="0"/>
+          </a:p>
+        </p:txBody>
+      </p:sp>
+      <p:sp>
+        <p:nvSpPr>
+          <p:cNvPr id="3" name="내용 개체 틀 2">
+            <a:extLst>
+              <a:ext uri="{FF2B5EF4-FFF2-40B4-BE49-F238E27FC236}">
+                <a16:creationId xmlns:a16="http://schemas.microsoft.com/office/drawing/2014/main" id="{F6F29D0A-1811-4C7B-4B89-FF13B0F8C940}"/>
+              </a:ext>
+            </a:extLst>
+          </p:cNvPr>
+          <p:cNvSpPr>
+            <a:spLocks noGrp="1"/>
+          </p:cNvSpPr>
+          <p:nvPr>
+            <p:ph idx="1"/>
+          </p:nvPr>
         </p:nvSpPr>
         <p:spPr>
           <a:xfrm>
-            <a:off x="7793372" y="1514410"/>
-            <a:ext cx="2035685" cy="1200329"/>
+            <a:off x="109057" y="1057014"/>
+            <a:ext cx="11870422" cy="5511426"/>
           </a:xfrm>
-          <a:prstGeom prst="rect">
-            <a:avLst/>
-          </a:prstGeom>
-          <a:noFill/>
         </p:spPr>
         <p:txBody>
-          <a:bodyPr wrap="none" rtlCol="0">
-            <a:spAutoFit/>
+          <a:bodyPr>
+            <a:noAutofit/>
           </a:bodyPr>
           <a:lstStyle/>
           <a:p>
-            <a:pPr marL="285750" indent="-285750">
-              <a:buFont typeface="Arial" panose="020B0604020202020204" pitchFamily="34" charset="0"/>
-              <a:buChar char="•"/>
-            </a:pPr>
-            <a:r>
-              <a:rPr lang="en-US" altLang="ko-KR" b="1" dirty="0"/>
-              <a:t>Q: Quaternion</a:t>
-            </a:r>
-          </a:p>
-          <a:p>
-            <a:pPr marL="285750" indent="-285750">
-              <a:buFont typeface="Arial" panose="020B0604020202020204" pitchFamily="34" charset="0"/>
-              <a:buChar char="•"/>
-            </a:pPr>
-            <a:r>
-              <a:rPr lang="en-US" altLang="ko-KR" b="1" dirty="0"/>
-              <a:t>E: Euler</a:t>
-            </a:r>
-          </a:p>
-          <a:p>
-            <a:pPr marL="285750" indent="-285750">
-              <a:buFont typeface="Arial" panose="020B0604020202020204" pitchFamily="34" charset="0"/>
-              <a:buChar char="•"/>
-            </a:pPr>
-            <a:r>
-              <a:rPr lang="en-US" altLang="ko-KR" b="1" dirty="0"/>
-              <a:t>A: Axis-Angle</a:t>
-            </a:r>
-          </a:p>
-          <a:p>
-            <a:pPr marL="285750" indent="-285750">
-              <a:buFont typeface="Arial" panose="020B0604020202020204" pitchFamily="34" charset="0"/>
-              <a:buChar char="•"/>
-            </a:pPr>
-            <a:r>
-              <a:rPr lang="en-US" altLang="ko-KR" b="1" dirty="0"/>
-              <a:t>M: Matrix</a:t>
-            </a:r>
-            <a:endParaRPr lang="ko-KR" altLang="en-US" b="1" dirty="0"/>
-          </a:p>
-        </p:txBody>
-      </p:sp>
-      <p:sp>
-        <p:nvSpPr>
-          <p:cNvPr id="10" name="TextBox 9">
-            <a:extLst>
-              <a:ext uri="{FF2B5EF4-FFF2-40B4-BE49-F238E27FC236}">
-                <a16:creationId xmlns:a16="http://schemas.microsoft.com/office/drawing/2014/main" id="{91D2F5C4-5DD7-8731-E8C3-24FB4CA84A18}"/>
-              </a:ext>
-            </a:extLst>
-          </p:cNvPr>
-          <p:cNvSpPr txBox="1"/>
-          <p:nvPr/>
-        </p:nvSpPr>
-        <p:spPr>
-          <a:xfrm>
-            <a:off x="2852257" y="1514410"/>
-            <a:ext cx="3543977" cy="5262979"/>
-          </a:xfrm>
-          <a:prstGeom prst="rect">
-            <a:avLst/>
-          </a:prstGeom>
-          <a:noFill/>
-        </p:spPr>
-        <p:txBody>
-          <a:bodyPr wrap="square">
-            <a:spAutoFit/>
-          </a:bodyPr>
-          <a:lstStyle/>
-          <a:p>
-            <a:r>
-              <a:rPr lang="ko-KR" altLang="en-US" sz="800" dirty="0" err="1"/>
-              <a:t>Link</a:t>
-            </a:r>
-            <a:r>
-              <a:rPr lang="ko-KR" altLang="en-US" sz="800" dirty="0"/>
-              <a:t> 0 </a:t>
-            </a:r>
-            <a:r>
-              <a:rPr lang="ko-KR" altLang="en-US" sz="800" dirty="0" err="1"/>
-              <a:t>Info</a:t>
-            </a:r>
-            <a:r>
-              <a:rPr lang="ko-KR" altLang="en-US" sz="800" dirty="0"/>
+            <a:r>
+              <a:rPr lang="en-US" altLang="ko-KR" sz="1400" dirty="0"/>
+              <a:t>Basic</a:t>
+            </a:r>
+            <a:r>
+              <a:rPr lang="ko-KR" altLang="en-US" sz="1400" dirty="0"/>
+              <a:t> </a:t>
+            </a:r>
+            <a:r>
+              <a:rPr lang="en-US" altLang="ko-KR" sz="1400" dirty="0"/>
+              <a:t>Kinematics</a:t>
+            </a:r>
+          </a:p>
+          <a:p>
+            <a:pPr lvl="1"/>
+            <a:r>
+              <a:rPr lang="en-US" altLang="ko-KR" sz="1400" strike="sngStrike" dirty="0"/>
+              <a:t>Modern Robotics </a:t>
+            </a:r>
+            <a:r>
+              <a:rPr lang="ko-KR" altLang="en-US" sz="1400" strike="sngStrike" dirty="0"/>
+              <a:t>코드 </a:t>
+            </a:r>
+            <a:r>
+              <a:rPr lang="en-US" altLang="ko-KR" sz="1400" strike="sngStrike" dirty="0" err="1"/>
+              <a:t>Notaion</a:t>
+            </a:r>
+            <a:r>
+              <a:rPr lang="en-US" altLang="ko-KR" sz="1400" strike="sngStrike" dirty="0"/>
+              <a:t> [</a:t>
+            </a:r>
+            <a:r>
+              <a:rPr lang="en-US" altLang="ko-KR" sz="1400" strike="sngStrike" dirty="0" err="1"/>
+              <a:t>w,v</a:t>
+            </a:r>
+            <a:r>
+              <a:rPr lang="en-US" altLang="ko-KR" sz="1400" strike="sngStrike" dirty="0"/>
+              <a:t>] &gt; [</a:t>
+            </a:r>
+            <a:r>
+              <a:rPr lang="en-US" altLang="ko-KR" sz="1400" strike="sngStrike" dirty="0" err="1"/>
+              <a:t>v,w</a:t>
+            </a:r>
+            <a:r>
+              <a:rPr lang="en-US" altLang="ko-KR" sz="1400" strike="sngStrike" dirty="0"/>
+              <a:t>] </a:t>
+            </a:r>
+            <a:r>
+              <a:rPr lang="ko-KR" altLang="en-US" sz="1400" strike="sngStrike" dirty="0"/>
+              <a:t>변경하고</a:t>
+            </a:r>
+            <a:r>
+              <a:rPr lang="en-US" altLang="ko-KR" sz="1400" strike="sngStrike" dirty="0"/>
+              <a:t>, </a:t>
+            </a:r>
+            <a:r>
+              <a:rPr lang="ko-KR" altLang="en-US" sz="1400" strike="sngStrike" dirty="0"/>
+              <a:t>코드 검증하기</a:t>
+            </a:r>
+            <a:endParaRPr lang="en-US" altLang="ko-KR" sz="1400" strike="sngStrike" dirty="0"/>
+          </a:p>
+          <a:p>
+            <a:pPr lvl="2"/>
+            <a:r>
+              <a:rPr lang="en-US" altLang="ko-KR" sz="1400" dirty="0"/>
+              <a:t>Advanced Robotics</a:t>
+            </a:r>
+            <a:r>
+              <a:rPr lang="ko-KR" altLang="en-US" sz="1400" dirty="0"/>
+              <a:t>에서 배운 </a:t>
+            </a:r>
+            <a:r>
+              <a:rPr lang="en-US" altLang="ko-KR" sz="1400" dirty="0"/>
+              <a:t>exponential map of twist </a:t>
+            </a:r>
+            <a:r>
+              <a:rPr lang="ko-KR" altLang="en-US" sz="1400" dirty="0"/>
+              <a:t>공식이 </a:t>
+            </a:r>
+            <a:r>
+              <a:rPr lang="en-US" altLang="ko-KR" sz="1400" dirty="0"/>
+              <a:t>modern robotics</a:t>
+            </a:r>
+            <a:r>
+              <a:rPr lang="ko-KR" altLang="en-US" sz="1400" dirty="0"/>
+              <a:t>에서 배운 식하고 동일하지 않음</a:t>
+            </a:r>
+            <a:r>
+              <a:rPr lang="en-US" altLang="ko-KR" sz="1400" dirty="0"/>
+              <a:t>. </a:t>
+            </a:r>
+            <a:r>
+              <a:rPr lang="ko-KR" altLang="en-US" sz="1400" dirty="0"/>
+              <a:t>확인 필요</a:t>
+            </a:r>
+            <a:endParaRPr lang="en-US" altLang="ko-KR" sz="1400" dirty="0"/>
+          </a:p>
+          <a:p>
+            <a:pPr lvl="1"/>
+            <a:r>
+              <a:rPr lang="en-US" altLang="ko-KR" sz="1400" strike="sngStrike" dirty="0"/>
+              <a:t>IndyRP2 Configuration</a:t>
+            </a:r>
+            <a:r>
+              <a:rPr lang="ko-KR" altLang="en-US" sz="1400" strike="sngStrike" dirty="0"/>
+              <a:t> 알아내기 </a:t>
+            </a:r>
+            <a:r>
+              <a:rPr lang="en-US" altLang="ko-KR" sz="1400" strike="sngStrike" dirty="0">
+                <a:sym typeface="Wingdings" panose="05000000000000000000" pitchFamily="2" charset="2"/>
+              </a:rPr>
+              <a:t> FK</a:t>
+            </a:r>
+            <a:r>
+              <a:rPr lang="ko-KR" altLang="en-US" sz="1400" strike="sngStrike" dirty="0">
+                <a:sym typeface="Wingdings" panose="05000000000000000000" pitchFamily="2" charset="2"/>
+              </a:rPr>
+              <a:t>를 통해 확인함</a:t>
+            </a:r>
+            <a:endParaRPr lang="en-US" altLang="ko-KR" sz="1400" strike="sngStrike" dirty="0"/>
+          </a:p>
+          <a:p>
+            <a:pPr lvl="1"/>
+            <a:r>
+              <a:rPr lang="en-US" altLang="ko-KR" sz="1400" strike="sngStrike" dirty="0"/>
+              <a:t>FK/IK</a:t>
+            </a:r>
+            <a:r>
+              <a:rPr lang="ko-KR" altLang="en-US" sz="1400" strike="sngStrike" dirty="0"/>
+              <a:t> 정상 작동하는지 확인하기 </a:t>
+            </a:r>
+            <a:r>
+              <a:rPr lang="en-US" altLang="ko-KR" sz="1400" strike="sngStrike" dirty="0">
+                <a:sym typeface="Wingdings" panose="05000000000000000000" pitchFamily="2" charset="2"/>
+              </a:rPr>
+              <a:t> IK/FK</a:t>
+            </a:r>
+            <a:r>
+              <a:rPr lang="ko-KR" altLang="en-US" sz="1400" strike="sngStrike" dirty="0">
+                <a:sym typeface="Wingdings" panose="05000000000000000000" pitchFamily="2" charset="2"/>
+              </a:rPr>
+              <a:t> 교차검증으로 확인함</a:t>
+            </a:r>
+            <a:endParaRPr lang="en-US" altLang="ko-KR" sz="1400" strike="sngStrike" dirty="0">
+              <a:sym typeface="Wingdings" panose="05000000000000000000" pitchFamily="2" charset="2"/>
+            </a:endParaRPr>
+          </a:p>
+          <a:p>
+            <a:pPr lvl="1"/>
+            <a:r>
+              <a:rPr lang="en-US" altLang="ko-KR" sz="1400" strike="sngStrike" dirty="0"/>
+              <a:t>End effector </a:t>
+            </a:r>
+            <a:r>
+              <a:rPr lang="ko-KR" altLang="en-US" sz="1400" strike="sngStrike" dirty="0"/>
+              <a:t>추가해서 </a:t>
+            </a:r>
+            <a:r>
+              <a:rPr lang="en-US" altLang="ko-KR" sz="1400" strike="sngStrike" dirty="0"/>
+              <a:t>FK/IK</a:t>
+            </a:r>
+            <a:r>
+              <a:rPr lang="ko-KR" altLang="en-US" sz="1400" strike="sngStrike" dirty="0"/>
+              <a:t>하기 </a:t>
+            </a:r>
+            <a:r>
+              <a:rPr lang="en-US" altLang="ko-KR" sz="1400" strike="sngStrike" dirty="0">
+                <a:sym typeface="Wingdings" panose="05000000000000000000" pitchFamily="2" charset="2"/>
+              </a:rPr>
+              <a:t> </a:t>
+            </a:r>
+            <a:r>
+              <a:rPr lang="ko-KR" altLang="en-US" sz="1400" strike="sngStrike" dirty="0">
+                <a:sym typeface="Wingdings" panose="05000000000000000000" pitchFamily="2" charset="2"/>
+              </a:rPr>
+              <a:t>눈으로 확인함</a:t>
+            </a:r>
+            <a:endParaRPr lang="en-US" altLang="ko-KR" sz="1400" strike="sngStrike" dirty="0">
+              <a:sym typeface="Wingdings" panose="05000000000000000000" pitchFamily="2" charset="2"/>
+            </a:endParaRPr>
+          </a:p>
+          <a:p>
+            <a:pPr lvl="1"/>
+            <a:r>
+              <a:rPr lang="en-US" altLang="ko-KR" sz="1400" strike="sngStrike" dirty="0"/>
+              <a:t>Trajectory</a:t>
+            </a:r>
+            <a:r>
+              <a:rPr lang="ko-KR" altLang="en-US" sz="1400" strike="sngStrike" dirty="0"/>
+              <a:t> </a:t>
+            </a:r>
+            <a:r>
+              <a:rPr lang="en-US" altLang="ko-KR" sz="1400" strike="sngStrike" dirty="0"/>
+              <a:t>Planning </a:t>
+            </a:r>
+            <a:r>
+              <a:rPr lang="ko-KR" altLang="en-US" sz="1400" strike="sngStrike" dirty="0"/>
+              <a:t>코딩하기 </a:t>
+            </a:r>
+            <a:r>
+              <a:rPr lang="en-US" altLang="ko-KR" sz="1400" strike="sngStrike" dirty="0">
+                <a:sym typeface="Wingdings" panose="05000000000000000000" pitchFamily="2" charset="2"/>
+              </a:rPr>
+              <a:t> </a:t>
+            </a:r>
+            <a:r>
+              <a:rPr lang="ko-KR" altLang="en-US" sz="1400" strike="sngStrike" dirty="0">
+                <a:sym typeface="Wingdings" panose="05000000000000000000" pitchFamily="2" charset="2"/>
+              </a:rPr>
+              <a:t>임의 원 생성까지 완료함</a:t>
+            </a:r>
+            <a:endParaRPr lang="en-US" altLang="ko-KR" sz="1400" strike="sngStrike" dirty="0"/>
+          </a:p>
+          <a:p>
+            <a:r>
+              <a:rPr lang="en-US" altLang="ko-KR" sz="1400" dirty="0"/>
+              <a:t>Generate circular trajectory</a:t>
+            </a:r>
+          </a:p>
+          <a:p>
+            <a:pPr lvl="1"/>
+            <a:r>
+              <a:rPr lang="en-US" altLang="ko-KR" sz="1400" strike="sngStrike" dirty="0"/>
+              <a:t>Arbitrary center/radius/position/orientation circular trajectory </a:t>
+            </a:r>
+            <a:r>
+              <a:rPr lang="ko-KR" altLang="en-US" sz="1400" strike="sngStrike" dirty="0"/>
+              <a:t>생성하고</a:t>
+            </a:r>
+            <a:r>
+              <a:rPr lang="en-US" altLang="ko-KR" sz="1400" strike="sngStrike" dirty="0"/>
+              <a:t>, 3D</a:t>
+            </a:r>
+            <a:r>
+              <a:rPr lang="ko-KR" altLang="en-US" sz="1400" strike="sngStrike" dirty="0"/>
+              <a:t>로 </a:t>
+            </a:r>
+            <a:r>
+              <a:rPr lang="en-US" altLang="ko-KR" sz="1400" strike="sngStrike" dirty="0"/>
+              <a:t>plot</a:t>
+            </a:r>
+            <a:r>
+              <a:rPr lang="ko-KR" altLang="en-US" sz="1400" strike="sngStrike" dirty="0"/>
+              <a:t>하기</a:t>
+            </a:r>
+            <a:endParaRPr lang="en-US" altLang="ko-KR" sz="1400" strike="sngStrike" dirty="0"/>
+          </a:p>
+          <a:p>
+            <a:pPr lvl="1"/>
+            <a:r>
+              <a:rPr lang="en-US" altLang="ko-KR" sz="1400" dirty="0"/>
+              <a:t>Circular trajectory tracking </a:t>
+            </a:r>
+            <a:r>
+              <a:rPr lang="ko-KR" altLang="en-US" sz="1400" dirty="0"/>
+              <a:t>하기</a:t>
+            </a:r>
+            <a:r>
+              <a:rPr lang="en-US" altLang="ko-KR" sz="1400" dirty="0"/>
               <a:t>: </a:t>
             </a:r>
-          </a:p>
-          <a:p>
-            <a:r>
-              <a:rPr lang="ko-KR" altLang="en-US" sz="800" dirty="0"/>
-              <a:t>-- </a:t>
-            </a:r>
-            <a:r>
-              <a:rPr lang="ko-KR" altLang="en-US" sz="800" dirty="0" err="1"/>
-              <a:t>Position</a:t>
-            </a:r>
-            <a:r>
-              <a:rPr lang="ko-KR" altLang="en-US" sz="800" dirty="0"/>
-              <a:t>:  [0.0, 0.0, 0.08]</a:t>
-            </a:r>
-          </a:p>
-          <a:p>
-            <a:r>
-              <a:rPr lang="ko-KR" altLang="en-US" sz="800" dirty="0"/>
-              <a:t>-- </a:t>
-            </a:r>
-            <a:r>
-              <a:rPr lang="ko-KR" altLang="en-US" sz="800" dirty="0" err="1"/>
-              <a:t>Orientation</a:t>
-            </a:r>
-            <a:r>
-              <a:rPr lang="ko-KR" altLang="en-US" sz="800" dirty="0"/>
-              <a:t>(</a:t>
-            </a:r>
-            <a:r>
-              <a:rPr lang="ko-KR" altLang="en-US" sz="800" dirty="0" err="1"/>
-              <a:t>Q</a:t>
-            </a:r>
-            <a:r>
-              <a:rPr lang="ko-KR" altLang="en-US" sz="800" dirty="0"/>
-              <a:t>):  [0.0, 0.0, -0.0, 1.0]</a:t>
-            </a:r>
-          </a:p>
-          <a:p>
-            <a:r>
-              <a:rPr lang="ko-KR" altLang="en-US" sz="800" dirty="0"/>
-              <a:t>-- </a:t>
-            </a:r>
-            <a:r>
-              <a:rPr lang="ko-KR" altLang="en-US" sz="800" dirty="0" err="1"/>
-              <a:t>Orientation</a:t>
-            </a:r>
-            <a:r>
-              <a:rPr lang="ko-KR" altLang="en-US" sz="800" dirty="0"/>
-              <a:t>(</a:t>
-            </a:r>
-            <a:r>
-              <a:rPr lang="ko-KR" altLang="en-US" sz="800" dirty="0" err="1"/>
-              <a:t>E</a:t>
-            </a:r>
-            <a:r>
-              <a:rPr lang="ko-KR" altLang="en-US" sz="800" dirty="0"/>
-              <a:t>):  [0.0, 0.0, -0.0]</a:t>
-            </a:r>
-          </a:p>
-          <a:p>
-            <a:r>
-              <a:rPr lang="ko-KR" altLang="en-US" sz="800" dirty="0"/>
-              <a:t>-- </a:t>
-            </a:r>
-            <a:r>
-              <a:rPr lang="ko-KR" altLang="en-US" sz="800" dirty="0" err="1"/>
-              <a:t>Orientation</a:t>
-            </a:r>
-            <a:r>
-              <a:rPr lang="ko-KR" altLang="en-US" sz="800" dirty="0"/>
-              <a:t>(</a:t>
-            </a:r>
-            <a:r>
-              <a:rPr lang="ko-KR" altLang="en-US" sz="800" dirty="0" err="1"/>
-              <a:t>A</a:t>
-            </a:r>
-            <a:r>
-              <a:rPr lang="ko-KR" altLang="en-US" sz="800" dirty="0"/>
-              <a:t>):  [1.0, 0.0, 0.0] 0.0</a:t>
-            </a:r>
-          </a:p>
-          <a:p>
-            <a:r>
-              <a:rPr lang="ko-KR" altLang="en-US" sz="800" dirty="0"/>
-              <a:t>-- </a:t>
-            </a:r>
-            <a:r>
-              <a:rPr lang="ko-KR" altLang="en-US" sz="800" dirty="0" err="1"/>
-              <a:t>Orientation</a:t>
-            </a:r>
-            <a:r>
-              <a:rPr lang="ko-KR" altLang="en-US" sz="800" dirty="0"/>
-              <a:t>(</a:t>
-            </a:r>
-            <a:r>
-              <a:rPr lang="ko-KR" altLang="en-US" sz="800" dirty="0" err="1"/>
-              <a:t>M</a:t>
-            </a:r>
-            <a:r>
-              <a:rPr lang="ko-KR" altLang="en-US" sz="800" dirty="0"/>
-              <a:t>):  [1.0, 0.0, 0.0, -0.0, 1.0, -0.0, -0.0, 0.0, 1.0]</a:t>
-            </a:r>
-          </a:p>
-          <a:p>
-            <a:r>
-              <a:rPr lang="ko-KR" altLang="en-US" sz="800" dirty="0" err="1"/>
-              <a:t>Link</a:t>
-            </a:r>
-            <a:r>
-              <a:rPr lang="ko-KR" altLang="en-US" sz="800" dirty="0"/>
-              <a:t> 1 </a:t>
-            </a:r>
-            <a:r>
-              <a:rPr lang="ko-KR" altLang="en-US" sz="800" dirty="0" err="1"/>
-              <a:t>Info</a:t>
-            </a:r>
-            <a:r>
-              <a:rPr lang="ko-KR" altLang="en-US" sz="800" dirty="0"/>
-              <a:t>: </a:t>
-            </a:r>
-          </a:p>
-          <a:p>
-            <a:r>
-              <a:rPr lang="ko-KR" altLang="en-US" sz="800" dirty="0"/>
-              <a:t>-- </a:t>
-            </a:r>
-            <a:r>
-              <a:rPr lang="ko-KR" altLang="en-US" sz="800" dirty="0" err="1"/>
-              <a:t>Position</a:t>
-            </a:r>
-            <a:r>
-              <a:rPr lang="ko-KR" altLang="en-US" sz="800" dirty="0"/>
-              <a:t>:  [-0.0, -0.11, 0.3]</a:t>
-            </a:r>
-          </a:p>
-          <a:p>
-            <a:r>
-              <a:rPr lang="ko-KR" altLang="en-US" sz="800" dirty="0"/>
-              <a:t>-- </a:t>
-            </a:r>
-            <a:r>
-              <a:rPr lang="ko-KR" altLang="en-US" sz="800" dirty="0" err="1"/>
-              <a:t>Orientation</a:t>
-            </a:r>
-            <a:r>
-              <a:rPr lang="ko-KR" altLang="en-US" sz="800" dirty="0"/>
-              <a:t>(</a:t>
-            </a:r>
-            <a:r>
-              <a:rPr lang="ko-KR" altLang="en-US" sz="800" dirty="0" err="1"/>
-              <a:t>Q</a:t>
-            </a:r>
-            <a:r>
-              <a:rPr lang="ko-KR" altLang="en-US" sz="800" dirty="0"/>
-              <a:t>):  [0.5, 0.5, -0.5, 0.5]</a:t>
-            </a:r>
-          </a:p>
-          <a:p>
-            <a:r>
-              <a:rPr lang="ko-KR" altLang="en-US" sz="800" dirty="0"/>
-              <a:t>-- </a:t>
-            </a:r>
-            <a:r>
-              <a:rPr lang="ko-KR" altLang="en-US" sz="800" dirty="0" err="1"/>
-              <a:t>Orientation</a:t>
-            </a:r>
-            <a:r>
-              <a:rPr lang="ko-KR" altLang="en-US" sz="800" dirty="0"/>
-              <a:t>(</a:t>
-            </a:r>
-            <a:r>
-              <a:rPr lang="ko-KR" altLang="en-US" sz="800" dirty="0" err="1"/>
-              <a:t>E</a:t>
-            </a:r>
-            <a:r>
-              <a:rPr lang="ko-KR" altLang="en-US" sz="800" dirty="0"/>
-              <a:t>):  [0.0, 90.0, -90.0]</a:t>
-            </a:r>
-          </a:p>
-          <a:p>
-            <a:r>
-              <a:rPr lang="ko-KR" altLang="en-US" sz="800" dirty="0"/>
-              <a:t>-- </a:t>
-            </a:r>
-            <a:r>
-              <a:rPr lang="ko-KR" altLang="en-US" sz="800" dirty="0" err="1"/>
-              <a:t>Orientation</a:t>
-            </a:r>
-            <a:r>
-              <a:rPr lang="ko-KR" altLang="en-US" sz="800" dirty="0"/>
-              <a:t>(</a:t>
-            </a:r>
-            <a:r>
-              <a:rPr lang="ko-KR" altLang="en-US" sz="800" dirty="0" err="1"/>
-              <a:t>A</a:t>
-            </a:r>
-            <a:r>
-              <a:rPr lang="ko-KR" altLang="en-US" sz="800" dirty="0"/>
-              <a:t>):  [0.57735, 0.57735, -0.57735] 120.0</a:t>
-            </a:r>
-          </a:p>
-          <a:p>
-            <a:r>
-              <a:rPr lang="ko-KR" altLang="en-US" sz="800" dirty="0"/>
-              <a:t>-- </a:t>
-            </a:r>
-            <a:r>
-              <a:rPr lang="ko-KR" altLang="en-US" sz="800" dirty="0" err="1"/>
-              <a:t>Orientation</a:t>
-            </a:r>
-            <a:r>
-              <a:rPr lang="ko-KR" altLang="en-US" sz="800" dirty="0"/>
-              <a:t>(</a:t>
-            </a:r>
-            <a:r>
-              <a:rPr lang="ko-KR" altLang="en-US" sz="800" dirty="0" err="1"/>
-              <a:t>M</a:t>
-            </a:r>
-            <a:r>
-              <a:rPr lang="ko-KR" altLang="en-US" sz="800" dirty="0"/>
-              <a:t>):  [0.0, 1.0, 0.0, 0.0, 0.0, -1.0, -1.0, 0.0, 0.0]</a:t>
-            </a:r>
-          </a:p>
-          <a:p>
-            <a:r>
-              <a:rPr lang="ko-KR" altLang="en-US" sz="800" dirty="0" err="1"/>
-              <a:t>Link</a:t>
-            </a:r>
-            <a:r>
-              <a:rPr lang="ko-KR" altLang="en-US" sz="800" dirty="0"/>
-              <a:t> 2 </a:t>
-            </a:r>
-            <a:r>
-              <a:rPr lang="ko-KR" altLang="en-US" sz="800" dirty="0" err="1"/>
-              <a:t>Info</a:t>
-            </a:r>
-            <a:r>
-              <a:rPr lang="ko-KR" altLang="en-US" sz="800" dirty="0"/>
-              <a:t>: </a:t>
-            </a:r>
-          </a:p>
-          <a:p>
-            <a:r>
-              <a:rPr lang="ko-KR" altLang="en-US" sz="800" dirty="0"/>
-              <a:t>-- </a:t>
-            </a:r>
-            <a:r>
-              <a:rPr lang="ko-KR" altLang="en-US" sz="800" dirty="0" err="1"/>
-              <a:t>Position</a:t>
-            </a:r>
-            <a:r>
-              <a:rPr lang="ko-KR" altLang="en-US" sz="800" dirty="0"/>
-              <a:t>:  [-0.0, -0.19, 0.68]</a:t>
-            </a:r>
-          </a:p>
-          <a:p>
-            <a:r>
-              <a:rPr lang="ko-KR" altLang="en-US" sz="800" dirty="0"/>
-              <a:t>-- </a:t>
-            </a:r>
-            <a:r>
-              <a:rPr lang="ko-KR" altLang="en-US" sz="800" dirty="0" err="1"/>
-              <a:t>Orientation</a:t>
-            </a:r>
-            <a:r>
-              <a:rPr lang="ko-KR" altLang="en-US" sz="800" dirty="0"/>
-              <a:t>(</a:t>
-            </a:r>
-            <a:r>
-              <a:rPr lang="ko-KR" altLang="en-US" sz="800" dirty="0" err="1"/>
-              <a:t>Q</a:t>
-            </a:r>
-            <a:r>
-              <a:rPr lang="ko-KR" altLang="en-US" sz="800" dirty="0"/>
-              <a:t>):  [0.0, 0.0, 0.0, 1.0]</a:t>
-            </a:r>
-          </a:p>
-          <a:p>
-            <a:r>
-              <a:rPr lang="ko-KR" altLang="en-US" sz="800" dirty="0"/>
-              <a:t>-- </a:t>
-            </a:r>
-            <a:r>
-              <a:rPr lang="ko-KR" altLang="en-US" sz="800" dirty="0" err="1"/>
-              <a:t>Orientation</a:t>
-            </a:r>
-            <a:r>
-              <a:rPr lang="ko-KR" altLang="en-US" sz="800" dirty="0"/>
-              <a:t>(</a:t>
-            </a:r>
-            <a:r>
-              <a:rPr lang="ko-KR" altLang="en-US" sz="800" dirty="0" err="1"/>
-              <a:t>E</a:t>
-            </a:r>
-            <a:r>
-              <a:rPr lang="ko-KR" altLang="en-US" sz="800" dirty="0"/>
-              <a:t>):  [0.0, -0.0, 0.0]</a:t>
-            </a:r>
-          </a:p>
-          <a:p>
-            <a:r>
-              <a:rPr lang="ko-KR" altLang="en-US" sz="800" dirty="0"/>
-              <a:t>-- </a:t>
-            </a:r>
-            <a:r>
-              <a:rPr lang="ko-KR" altLang="en-US" sz="800" dirty="0" err="1"/>
-              <a:t>Orientation</a:t>
-            </a:r>
-            <a:r>
-              <a:rPr lang="ko-KR" altLang="en-US" sz="800" dirty="0"/>
-              <a:t>(</a:t>
-            </a:r>
-            <a:r>
-              <a:rPr lang="ko-KR" altLang="en-US" sz="800" dirty="0" err="1"/>
-              <a:t>A</a:t>
-            </a:r>
-            <a:r>
-              <a:rPr lang="ko-KR" altLang="en-US" sz="800" dirty="0"/>
-              <a:t>):  [1.0, 0.0, 0.0] 0.0</a:t>
-            </a:r>
-          </a:p>
-          <a:p>
-            <a:r>
-              <a:rPr lang="ko-KR" altLang="en-US" sz="800" dirty="0"/>
-              <a:t>-- </a:t>
-            </a:r>
-            <a:r>
-              <a:rPr lang="ko-KR" altLang="en-US" sz="800" dirty="0" err="1"/>
-              <a:t>Orientation</a:t>
-            </a:r>
-            <a:r>
-              <a:rPr lang="ko-KR" altLang="en-US" sz="800" dirty="0"/>
-              <a:t>(</a:t>
-            </a:r>
-            <a:r>
-              <a:rPr lang="ko-KR" altLang="en-US" sz="800" dirty="0" err="1"/>
-              <a:t>M</a:t>
-            </a:r>
-            <a:r>
-              <a:rPr lang="ko-KR" altLang="en-US" sz="800" dirty="0"/>
-              <a:t>):  [1.0, -0.0, 0.0, 0.0, 1.0, -0.0, 0.0, 0.0, 1.0]</a:t>
-            </a:r>
-          </a:p>
-          <a:p>
-            <a:r>
-              <a:rPr lang="ko-KR" altLang="en-US" sz="800" dirty="0" err="1"/>
-              <a:t>Link</a:t>
-            </a:r>
-            <a:r>
-              <a:rPr lang="ko-KR" altLang="en-US" sz="800" dirty="0"/>
-              <a:t> 3 </a:t>
-            </a:r>
-            <a:r>
-              <a:rPr lang="ko-KR" altLang="en-US" sz="800" dirty="0" err="1"/>
-              <a:t>Info</a:t>
-            </a:r>
-            <a:r>
-              <a:rPr lang="ko-KR" altLang="en-US" sz="800" dirty="0"/>
-              <a:t>: </a:t>
-            </a:r>
-          </a:p>
-          <a:p>
-            <a:r>
-              <a:rPr lang="ko-KR" altLang="en-US" sz="800" dirty="0"/>
-              <a:t>-- </a:t>
-            </a:r>
-            <a:r>
-              <a:rPr lang="ko-KR" altLang="en-US" sz="800" dirty="0" err="1"/>
-              <a:t>Position</a:t>
-            </a:r>
-            <a:r>
-              <a:rPr lang="ko-KR" altLang="en-US" sz="800" dirty="0"/>
-              <a:t>:  [-0.0, -0.08, 0.75]</a:t>
-            </a:r>
-          </a:p>
-          <a:p>
-            <a:r>
-              <a:rPr lang="ko-KR" altLang="en-US" sz="800" dirty="0"/>
-              <a:t>-- </a:t>
-            </a:r>
-            <a:r>
-              <a:rPr lang="ko-KR" altLang="en-US" sz="800" dirty="0" err="1"/>
-              <a:t>Orientation</a:t>
-            </a:r>
-            <a:r>
-              <a:rPr lang="ko-KR" altLang="en-US" sz="800" dirty="0"/>
-              <a:t>(</a:t>
-            </a:r>
-            <a:r>
-              <a:rPr lang="ko-KR" altLang="en-US" sz="800" dirty="0" err="1"/>
-              <a:t>Q</a:t>
-            </a:r>
-            <a:r>
-              <a:rPr lang="ko-KR" altLang="en-US" sz="800" dirty="0"/>
-              <a:t>):  [0.5, 0.5, -0.5, 0.5]</a:t>
-            </a:r>
-          </a:p>
-          <a:p>
-            <a:r>
-              <a:rPr lang="ko-KR" altLang="en-US" sz="800" dirty="0"/>
-              <a:t>-- </a:t>
-            </a:r>
-            <a:r>
-              <a:rPr lang="ko-KR" altLang="en-US" sz="800" dirty="0" err="1"/>
-              <a:t>Orientation</a:t>
-            </a:r>
-            <a:r>
-              <a:rPr lang="ko-KR" altLang="en-US" sz="800" dirty="0"/>
-              <a:t>(</a:t>
-            </a:r>
-            <a:r>
-              <a:rPr lang="ko-KR" altLang="en-US" sz="800" dirty="0" err="1"/>
-              <a:t>E</a:t>
-            </a:r>
-            <a:r>
-              <a:rPr lang="ko-KR" altLang="en-US" sz="800" dirty="0"/>
-              <a:t>):  [0.0, 90.0, -90.0]</a:t>
-            </a:r>
-          </a:p>
-          <a:p>
-            <a:r>
-              <a:rPr lang="ko-KR" altLang="en-US" sz="800" dirty="0"/>
-              <a:t>-- </a:t>
-            </a:r>
-            <a:r>
-              <a:rPr lang="ko-KR" altLang="en-US" sz="800" dirty="0" err="1"/>
-              <a:t>Orientation</a:t>
-            </a:r>
-            <a:r>
-              <a:rPr lang="ko-KR" altLang="en-US" sz="800" dirty="0"/>
-              <a:t>(</a:t>
-            </a:r>
-            <a:r>
-              <a:rPr lang="ko-KR" altLang="en-US" sz="800" dirty="0" err="1"/>
-              <a:t>A</a:t>
-            </a:r>
-            <a:r>
-              <a:rPr lang="ko-KR" altLang="en-US" sz="800" dirty="0"/>
-              <a:t>):  [0.57735, 0.57735, -0.57735] 120.0</a:t>
-            </a:r>
-          </a:p>
-          <a:p>
-            <a:r>
-              <a:rPr lang="ko-KR" altLang="en-US" sz="800" dirty="0"/>
-              <a:t>-- </a:t>
-            </a:r>
-            <a:r>
-              <a:rPr lang="ko-KR" altLang="en-US" sz="800" dirty="0" err="1"/>
-              <a:t>Orientation</a:t>
-            </a:r>
-            <a:r>
-              <a:rPr lang="ko-KR" altLang="en-US" sz="800" dirty="0"/>
-              <a:t>(</a:t>
-            </a:r>
-            <a:r>
-              <a:rPr lang="ko-KR" altLang="en-US" sz="800" dirty="0" err="1"/>
-              <a:t>M</a:t>
-            </a:r>
-            <a:r>
-              <a:rPr lang="ko-KR" altLang="en-US" sz="800" dirty="0"/>
-              <a:t>):  [0.0, 1.0, 0.0, 0.0, 0.0, -1.0, -1.0, 0.0, -0.0]</a:t>
-            </a:r>
-          </a:p>
-          <a:p>
-            <a:r>
-              <a:rPr lang="ko-KR" altLang="en-US" sz="800" dirty="0" err="1"/>
-              <a:t>Link</a:t>
-            </a:r>
-            <a:r>
-              <a:rPr lang="ko-KR" altLang="en-US" sz="800" dirty="0"/>
-              <a:t> 4 </a:t>
-            </a:r>
-            <a:r>
-              <a:rPr lang="ko-KR" altLang="en-US" sz="800" dirty="0" err="1"/>
-              <a:t>Info</a:t>
-            </a:r>
-            <a:r>
-              <a:rPr lang="ko-KR" altLang="en-US" sz="800" dirty="0"/>
-              <a:t>: </a:t>
-            </a:r>
-          </a:p>
-          <a:p>
-            <a:r>
-              <a:rPr lang="ko-KR" altLang="en-US" sz="800" dirty="0"/>
-              <a:t>-- </a:t>
-            </a:r>
-            <a:r>
-              <a:rPr lang="ko-KR" altLang="en-US" sz="800" dirty="0" err="1"/>
-              <a:t>Position</a:t>
-            </a:r>
-            <a:r>
-              <a:rPr lang="ko-KR" altLang="en-US" sz="800" dirty="0"/>
-              <a:t>:  [-0.0, -0.0, 1.02]</a:t>
-            </a:r>
-          </a:p>
-          <a:p>
-            <a:r>
-              <a:rPr lang="ko-KR" altLang="en-US" sz="800" dirty="0"/>
-              <a:t>-- </a:t>
-            </a:r>
-            <a:r>
-              <a:rPr lang="ko-KR" altLang="en-US" sz="800" dirty="0" err="1"/>
-              <a:t>Orientation</a:t>
-            </a:r>
-            <a:r>
-              <a:rPr lang="ko-KR" altLang="en-US" sz="800" dirty="0"/>
-              <a:t>(</a:t>
-            </a:r>
-            <a:r>
-              <a:rPr lang="ko-KR" altLang="en-US" sz="800" dirty="0" err="1"/>
-              <a:t>Q</a:t>
-            </a:r>
-            <a:r>
-              <a:rPr lang="ko-KR" altLang="en-US" sz="800" dirty="0"/>
-              <a:t>):  [0.0, -0.0, 0.0, 1.0]</a:t>
-            </a:r>
-          </a:p>
-          <a:p>
-            <a:r>
-              <a:rPr lang="ko-KR" altLang="en-US" sz="800" dirty="0"/>
-              <a:t>-- </a:t>
-            </a:r>
-            <a:r>
-              <a:rPr lang="ko-KR" altLang="en-US" sz="800" dirty="0" err="1"/>
-              <a:t>Orientation</a:t>
-            </a:r>
-            <a:r>
-              <a:rPr lang="ko-KR" altLang="en-US" sz="800" dirty="0"/>
-              <a:t>(</a:t>
-            </a:r>
-            <a:r>
-              <a:rPr lang="ko-KR" altLang="en-US" sz="800" dirty="0" err="1"/>
-              <a:t>E</a:t>
-            </a:r>
-            <a:r>
-              <a:rPr lang="ko-KR" altLang="en-US" sz="800" dirty="0"/>
-              <a:t>):  [0.0, -0.0, 0.0]</a:t>
-            </a:r>
-          </a:p>
-          <a:p>
-            <a:r>
-              <a:rPr lang="ko-KR" altLang="en-US" sz="800" dirty="0"/>
-              <a:t>-- </a:t>
-            </a:r>
-            <a:r>
-              <a:rPr lang="ko-KR" altLang="en-US" sz="800" dirty="0" err="1"/>
-              <a:t>Orientation</a:t>
-            </a:r>
-            <a:r>
-              <a:rPr lang="ko-KR" altLang="en-US" sz="800" dirty="0"/>
-              <a:t>(</a:t>
-            </a:r>
-            <a:r>
-              <a:rPr lang="ko-KR" altLang="en-US" sz="800" dirty="0" err="1"/>
-              <a:t>A</a:t>
-            </a:r>
-            <a:r>
-              <a:rPr lang="ko-KR" altLang="en-US" sz="800" dirty="0"/>
-              <a:t>):  [1.0, 0.0, 0.0] 0.0</a:t>
-            </a:r>
-          </a:p>
-          <a:p>
-            <a:r>
-              <a:rPr lang="ko-KR" altLang="en-US" sz="800" dirty="0"/>
-              <a:t>-- </a:t>
-            </a:r>
-            <a:r>
-              <a:rPr lang="ko-KR" altLang="en-US" sz="800" dirty="0" err="1"/>
-              <a:t>Orientation</a:t>
-            </a:r>
-            <a:r>
-              <a:rPr lang="ko-KR" altLang="en-US" sz="800" dirty="0"/>
-              <a:t>(</a:t>
-            </a:r>
-            <a:r>
-              <a:rPr lang="ko-KR" altLang="en-US" sz="800" dirty="0" err="1"/>
-              <a:t>M</a:t>
-            </a:r>
-            <a:r>
-              <a:rPr lang="ko-KR" altLang="en-US" sz="800" dirty="0"/>
-              <a:t>):  [1.0, -0.0, -0.0, 0.0, 1.0, -0.0, 0.0, 0.0, 1.0]</a:t>
-            </a:r>
-          </a:p>
-          <a:p>
-            <a:r>
-              <a:rPr lang="ko-KR" altLang="en-US" sz="800" dirty="0" err="1"/>
-              <a:t>Link</a:t>
-            </a:r>
-            <a:r>
-              <a:rPr lang="ko-KR" altLang="en-US" sz="800" dirty="0"/>
-              <a:t> 5 </a:t>
-            </a:r>
-            <a:r>
-              <a:rPr lang="ko-KR" altLang="en-US" sz="800" dirty="0" err="1"/>
-              <a:t>Info</a:t>
-            </a:r>
-            <a:r>
-              <a:rPr lang="ko-KR" altLang="en-US" sz="800" dirty="0"/>
-              <a:t>: </a:t>
-            </a:r>
-          </a:p>
-          <a:p>
-            <a:r>
-              <a:rPr lang="ko-KR" altLang="en-US" sz="800" dirty="0"/>
-              <a:t>-- </a:t>
-            </a:r>
-            <a:r>
-              <a:rPr lang="ko-KR" altLang="en-US" sz="800" dirty="0" err="1"/>
-              <a:t>Position</a:t>
-            </a:r>
-            <a:r>
-              <a:rPr lang="ko-KR" altLang="en-US" sz="800" dirty="0"/>
-              <a:t>:  [-0.0, -0.12, 1.1]</a:t>
-            </a:r>
-          </a:p>
-          <a:p>
-            <a:r>
-              <a:rPr lang="ko-KR" altLang="en-US" sz="800" dirty="0"/>
-              <a:t>-- </a:t>
-            </a:r>
-            <a:r>
-              <a:rPr lang="ko-KR" altLang="en-US" sz="800" dirty="0" err="1"/>
-              <a:t>Orientation</a:t>
-            </a:r>
-            <a:r>
-              <a:rPr lang="ko-KR" altLang="en-US" sz="800" dirty="0"/>
-              <a:t>(</a:t>
-            </a:r>
-            <a:r>
-              <a:rPr lang="ko-KR" altLang="en-US" sz="800" dirty="0" err="1"/>
-              <a:t>Q</a:t>
-            </a:r>
-            <a:r>
-              <a:rPr lang="ko-KR" altLang="en-US" sz="800" dirty="0"/>
-              <a:t>):  [0.5, 0.5, -0.5, 0.5]</a:t>
-            </a:r>
-          </a:p>
-          <a:p>
-            <a:r>
-              <a:rPr lang="ko-KR" altLang="en-US" sz="800" dirty="0"/>
-              <a:t>-- </a:t>
-            </a:r>
-            <a:r>
-              <a:rPr lang="ko-KR" altLang="en-US" sz="800" dirty="0" err="1"/>
-              <a:t>Orientation</a:t>
-            </a:r>
-            <a:r>
-              <a:rPr lang="ko-KR" altLang="en-US" sz="800" dirty="0"/>
-              <a:t>(</a:t>
-            </a:r>
-            <a:r>
-              <a:rPr lang="ko-KR" altLang="en-US" sz="800" dirty="0" err="1"/>
-              <a:t>E</a:t>
-            </a:r>
-            <a:r>
-              <a:rPr lang="ko-KR" altLang="en-US" sz="800" dirty="0"/>
-              <a:t>):  [0.0, 90.0, -90.0]</a:t>
-            </a:r>
-          </a:p>
-          <a:p>
-            <a:r>
-              <a:rPr lang="ko-KR" altLang="en-US" sz="800" dirty="0"/>
-              <a:t>-- </a:t>
-            </a:r>
-            <a:r>
-              <a:rPr lang="ko-KR" altLang="en-US" sz="800" dirty="0" err="1"/>
-              <a:t>Orientation</a:t>
-            </a:r>
-            <a:r>
-              <a:rPr lang="ko-KR" altLang="en-US" sz="800" dirty="0"/>
-              <a:t>(</a:t>
-            </a:r>
-            <a:r>
-              <a:rPr lang="ko-KR" altLang="en-US" sz="800" dirty="0" err="1"/>
-              <a:t>A</a:t>
-            </a:r>
-            <a:r>
-              <a:rPr lang="ko-KR" altLang="en-US" sz="800" dirty="0"/>
-              <a:t>):  [0.57735, 0.57735, -0.57735] 120.0</a:t>
-            </a:r>
-          </a:p>
-          <a:p>
-            <a:r>
-              <a:rPr lang="ko-KR" altLang="en-US" sz="800" dirty="0"/>
-              <a:t>-- </a:t>
-            </a:r>
-            <a:r>
-              <a:rPr lang="ko-KR" altLang="en-US" sz="800" dirty="0" err="1"/>
-              <a:t>Orientation</a:t>
-            </a:r>
-            <a:r>
-              <a:rPr lang="ko-KR" altLang="en-US" sz="800" dirty="0"/>
-              <a:t>(</a:t>
-            </a:r>
-            <a:r>
-              <a:rPr lang="ko-KR" altLang="en-US" sz="800" dirty="0" err="1"/>
-              <a:t>M</a:t>
-            </a:r>
-            <a:r>
-              <a:rPr lang="ko-KR" altLang="en-US" sz="800" dirty="0"/>
-              <a:t>):  [0.0, 1.0, 0.0, 0.0, 0.0, -1.0, -1.0, 0.0, -0.0]</a:t>
-            </a:r>
-          </a:p>
-          <a:p>
-            <a:r>
-              <a:rPr lang="ko-KR" altLang="en-US" sz="800" dirty="0" err="1"/>
-              <a:t>Link</a:t>
-            </a:r>
-            <a:r>
-              <a:rPr lang="ko-KR" altLang="en-US" sz="800" dirty="0"/>
-              <a:t> 6 </a:t>
-            </a:r>
-            <a:r>
-              <a:rPr lang="ko-KR" altLang="en-US" sz="800" dirty="0" err="1"/>
-              <a:t>Info</a:t>
-            </a:r>
-            <a:r>
-              <a:rPr lang="ko-KR" altLang="en-US" sz="800" dirty="0"/>
-              <a:t>: </a:t>
-            </a:r>
-          </a:p>
-          <a:p>
-            <a:r>
-              <a:rPr lang="ko-KR" altLang="en-US" sz="800" dirty="0"/>
-              <a:t>-- </a:t>
-            </a:r>
-            <a:r>
-              <a:rPr lang="ko-KR" altLang="en-US" sz="800" dirty="0" err="1"/>
-              <a:t>Position</a:t>
-            </a:r>
-            <a:r>
-              <a:rPr lang="ko-KR" altLang="en-US" sz="800" dirty="0"/>
-              <a:t>:  [-0.0, -0.19, 1.27]</a:t>
-            </a:r>
-          </a:p>
-          <a:p>
-            <a:r>
-              <a:rPr lang="ko-KR" altLang="en-US" sz="800" dirty="0"/>
-              <a:t>-- </a:t>
-            </a:r>
-            <a:r>
-              <a:rPr lang="ko-KR" altLang="en-US" sz="800" dirty="0" err="1"/>
-              <a:t>Orientation</a:t>
-            </a:r>
-            <a:r>
-              <a:rPr lang="ko-KR" altLang="en-US" sz="800" dirty="0"/>
-              <a:t>(</a:t>
-            </a:r>
-            <a:r>
-              <a:rPr lang="ko-KR" altLang="en-US" sz="800" dirty="0" err="1"/>
-              <a:t>Q</a:t>
-            </a:r>
-            <a:r>
-              <a:rPr lang="ko-KR" altLang="en-US" sz="800" dirty="0"/>
-              <a:t>):  [0.0, -0.0, 0.0, 1.0]</a:t>
-            </a:r>
-          </a:p>
-          <a:p>
-            <a:r>
-              <a:rPr lang="ko-KR" altLang="en-US" sz="800" dirty="0"/>
-              <a:t>-- </a:t>
-            </a:r>
-            <a:r>
-              <a:rPr lang="ko-KR" altLang="en-US" sz="800" dirty="0" err="1"/>
-              <a:t>Orientation</a:t>
-            </a:r>
-            <a:r>
-              <a:rPr lang="ko-KR" altLang="en-US" sz="800" dirty="0"/>
-              <a:t>(</a:t>
-            </a:r>
-            <a:r>
-              <a:rPr lang="ko-KR" altLang="en-US" sz="800" dirty="0" err="1"/>
-              <a:t>E</a:t>
-            </a:r>
-            <a:r>
-              <a:rPr lang="ko-KR" altLang="en-US" sz="800" dirty="0"/>
-              <a:t>):  [0.0, -0.0, 0.0]</a:t>
-            </a:r>
-          </a:p>
-          <a:p>
-            <a:r>
-              <a:rPr lang="ko-KR" altLang="en-US" sz="800" dirty="0"/>
-              <a:t>-- </a:t>
-            </a:r>
-            <a:r>
-              <a:rPr lang="ko-KR" altLang="en-US" sz="800" dirty="0" err="1"/>
-              <a:t>Orientation</a:t>
-            </a:r>
-            <a:r>
-              <a:rPr lang="ko-KR" altLang="en-US" sz="800" dirty="0"/>
-              <a:t>(</a:t>
-            </a:r>
-            <a:r>
-              <a:rPr lang="ko-KR" altLang="en-US" sz="800" dirty="0" err="1"/>
-              <a:t>A</a:t>
-            </a:r>
-            <a:r>
-              <a:rPr lang="ko-KR" altLang="en-US" sz="800" dirty="0"/>
-              <a:t>):  [1.0, 0.0, 0.0] 0.0</a:t>
-            </a:r>
-          </a:p>
-          <a:p>
-            <a:r>
-              <a:rPr lang="ko-KR" altLang="en-US" sz="800" dirty="0"/>
-              <a:t>-- </a:t>
-            </a:r>
-            <a:r>
-              <a:rPr lang="ko-KR" altLang="en-US" sz="800" dirty="0" err="1"/>
-              <a:t>Orientation</a:t>
-            </a:r>
-            <a:r>
-              <a:rPr lang="ko-KR" altLang="en-US" sz="800" dirty="0"/>
-              <a:t>(</a:t>
-            </a:r>
-            <a:r>
-              <a:rPr lang="ko-KR" altLang="en-US" sz="800" dirty="0" err="1"/>
-              <a:t>M</a:t>
-            </a:r>
-            <a:r>
-              <a:rPr lang="ko-KR" altLang="en-US" sz="800" dirty="0"/>
-              <a:t>):  [1.0, -0.0, -0.0, 0.0, 1.0, -0.0, 0.0, 0.0, 1.0]</a:t>
-            </a:r>
+            <a:r>
+              <a:rPr lang="ko-KR" altLang="en-US" sz="1400" dirty="0"/>
+              <a:t>코드 정리</a:t>
+            </a:r>
+            <a:r>
+              <a:rPr lang="en-US" altLang="ko-KR" sz="1400" dirty="0"/>
+              <a:t>4</a:t>
+            </a:r>
+            <a:r>
+              <a:rPr lang="ko-KR" altLang="en-US" sz="1400" dirty="0"/>
+              <a:t> </a:t>
+            </a:r>
+            <a:r>
+              <a:rPr lang="en-US" altLang="ko-KR" sz="1400" dirty="0"/>
+              <a:t>(time</a:t>
+            </a:r>
+            <a:r>
+              <a:rPr lang="ko-KR" altLang="en-US" sz="1400" dirty="0"/>
+              <a:t> 측정</a:t>
+            </a:r>
+            <a:r>
+              <a:rPr lang="en-US" altLang="ko-KR" sz="1400" dirty="0"/>
+              <a:t>)</a:t>
+            </a:r>
+          </a:p>
+          <a:p>
+            <a:r>
+              <a:rPr lang="en-US" altLang="ko-KR" sz="1400" dirty="0"/>
+              <a:t>Null Motion</a:t>
+            </a:r>
+          </a:p>
+          <a:p>
+            <a:pPr lvl="1"/>
+            <a:r>
+              <a:rPr lang="en-US" altLang="ko-KR" sz="1400" dirty="0"/>
+              <a:t>Joint Limit avoidance </a:t>
+            </a:r>
+            <a:r>
+              <a:rPr lang="ko-KR" altLang="en-US" sz="1400" dirty="0"/>
+              <a:t>판정하기</a:t>
+            </a:r>
+            <a:endParaRPr lang="en-US" altLang="ko-KR" sz="1400" dirty="0"/>
+          </a:p>
+          <a:p>
+            <a:pPr lvl="1"/>
+            <a:r>
+              <a:rPr lang="en-US" altLang="ko-KR" sz="1400" dirty="0"/>
+              <a:t>Manipulability</a:t>
+            </a:r>
+            <a:r>
+              <a:rPr lang="ko-KR" altLang="en-US" sz="1400" dirty="0"/>
+              <a:t> </a:t>
+            </a:r>
+            <a:r>
+              <a:rPr lang="en-US" altLang="ko-KR" sz="1400" dirty="0"/>
+              <a:t>Maximization </a:t>
+            </a:r>
+            <a:r>
+              <a:rPr lang="ko-KR" altLang="en-US" sz="1400" dirty="0"/>
+              <a:t>최적화하기</a:t>
+            </a:r>
+            <a:endParaRPr lang="en-US" altLang="ko-KR" sz="1400" dirty="0"/>
+          </a:p>
+          <a:p>
+            <a:pPr lvl="1"/>
+            <a:r>
+              <a:rPr lang="en-US" altLang="ko-KR" sz="1400" dirty="0"/>
+              <a:t>Potential function minimization </a:t>
+            </a:r>
+            <a:r>
+              <a:rPr lang="ko-KR" altLang="en-US" sz="1400" dirty="0"/>
+              <a:t>최적화하기</a:t>
+            </a:r>
+            <a:endParaRPr lang="en-US" altLang="ko-KR" sz="1400" dirty="0"/>
+          </a:p>
+          <a:p>
+            <a:r>
+              <a:rPr lang="en-US" altLang="ko-KR" sz="1400" dirty="0"/>
+              <a:t>Plotting</a:t>
+            </a:r>
+          </a:p>
+          <a:p>
+            <a:pPr lvl="1"/>
+            <a:r>
+              <a:rPr lang="en-US" altLang="ko-KR" sz="1400" dirty="0"/>
+              <a:t>Joint</a:t>
+            </a:r>
+            <a:r>
+              <a:rPr lang="ko-KR" altLang="en-US" sz="1400" dirty="0"/>
+              <a:t> </a:t>
+            </a:r>
+            <a:r>
+              <a:rPr lang="en-US" altLang="ko-KR" sz="1400" dirty="0"/>
+              <a:t>angle,</a:t>
+            </a:r>
+            <a:r>
+              <a:rPr lang="ko-KR" altLang="en-US" sz="1400" dirty="0"/>
+              <a:t> </a:t>
+            </a:r>
+            <a:r>
+              <a:rPr lang="en-US" altLang="ko-KR" sz="1400" dirty="0"/>
+              <a:t>joint</a:t>
+            </a:r>
+            <a:r>
+              <a:rPr lang="ko-KR" altLang="en-US" sz="1400" dirty="0"/>
+              <a:t> </a:t>
+            </a:r>
+            <a:r>
+              <a:rPr lang="en-US" altLang="ko-KR" sz="1400" dirty="0"/>
+              <a:t>velocity</a:t>
+            </a:r>
+            <a:r>
+              <a:rPr lang="ko-KR" altLang="en-US" sz="1400" dirty="0"/>
+              <a:t> 가시화하기</a:t>
+            </a:r>
+            <a:endParaRPr lang="en-US" altLang="ko-KR" sz="1400" dirty="0"/>
+          </a:p>
+          <a:p>
+            <a:pPr lvl="1"/>
+            <a:r>
+              <a:rPr lang="en-US" altLang="ko-KR" sz="1400" dirty="0"/>
+              <a:t>End-Effector</a:t>
+            </a:r>
+            <a:r>
+              <a:rPr lang="ko-KR" altLang="en-US" sz="1400" dirty="0"/>
+              <a:t>의 </a:t>
+            </a:r>
+            <a:r>
+              <a:rPr lang="en-US" altLang="ko-KR" sz="1400" dirty="0"/>
+              <a:t>Euler angle </a:t>
+            </a:r>
+            <a:r>
+              <a:rPr lang="ko-KR" altLang="en-US" sz="1400" dirty="0"/>
+              <a:t>가시화하기</a:t>
+            </a:r>
+            <a:endParaRPr lang="en-US" altLang="ko-KR" sz="1400" dirty="0"/>
+          </a:p>
+          <a:p>
+            <a:pPr lvl="1"/>
+            <a:r>
+              <a:rPr lang="en-US" altLang="ko-KR" sz="1400" dirty="0"/>
+              <a:t>Manipulability</a:t>
+            </a:r>
+            <a:r>
+              <a:rPr lang="ko-KR" altLang="en-US" sz="1400" dirty="0"/>
+              <a:t> 가시화하기</a:t>
+            </a:r>
+            <a:endParaRPr lang="en-US" altLang="ko-KR" sz="1400" dirty="0"/>
+          </a:p>
+          <a:p>
+            <a:pPr lvl="1"/>
+            <a:r>
+              <a:rPr lang="en-US" altLang="ko-KR" sz="1400" dirty="0"/>
+              <a:t>Potential function </a:t>
+            </a:r>
+            <a:r>
+              <a:rPr lang="ko-KR" altLang="en-US" sz="1400" dirty="0"/>
+              <a:t>가시화하기</a:t>
+            </a:r>
+            <a:endParaRPr lang="en-US" altLang="ko-KR" sz="1400" dirty="0"/>
+          </a:p>
+          <a:p>
+            <a:pPr lvl="1"/>
+            <a:r>
+              <a:rPr lang="en-US" altLang="ko-KR" sz="1400" strike="sngStrike" dirty="0"/>
+              <a:t>Tracking Error </a:t>
+            </a:r>
+            <a:r>
+              <a:rPr lang="ko-KR" altLang="en-US" sz="1400" strike="sngStrike" dirty="0"/>
+              <a:t>가시화하기</a:t>
+            </a:r>
+            <a:endParaRPr lang="en-US" altLang="ko-KR" sz="1400" strike="sngStrike" dirty="0"/>
+          </a:p>
+          <a:p>
+            <a:pPr lvl="1"/>
+            <a:endParaRPr lang="en-US" altLang="ko-KR" sz="1400" dirty="0"/>
+          </a:p>
+          <a:p>
+            <a:endParaRPr lang="ko-KR" altLang="en-US" sz="1400" dirty="0"/>
           </a:p>
         </p:txBody>
       </p:sp>
     </p:spTree>
     <p:extLst>
       <p:ext uri="{BB962C8B-B14F-4D97-AF65-F5344CB8AC3E}">
-        <p14:creationId xmlns:p14="http://schemas.microsoft.com/office/powerpoint/2010/main" val="500037662"/>
+        <p14:creationId xmlns:p14="http://schemas.microsoft.com/office/powerpoint/2010/main" val="1357059974"/>
       </p:ext>
     </p:extLst>
   </p:cSld>
@@ -4451,6 +3972,1034 @@
           <p:cNvPr id="2" name="제목 1">
             <a:extLst>
               <a:ext uri="{FF2B5EF4-FFF2-40B4-BE49-F238E27FC236}">
+                <a16:creationId xmlns:a16="http://schemas.microsoft.com/office/drawing/2014/main" id="{D4291F4B-E067-D853-657D-7FA2D5D9D58A}"/>
+              </a:ext>
+            </a:extLst>
+          </p:cNvPr>
+          <p:cNvSpPr>
+            <a:spLocks noGrp="1"/>
+          </p:cNvSpPr>
+          <p:nvPr>
+            <p:ph type="title"/>
+          </p:nvPr>
+        </p:nvSpPr>
+        <p:spPr/>
+        <p:txBody>
+          <a:bodyPr/>
+          <a:lstStyle/>
+          <a:p>
+            <a:r>
+              <a:rPr lang="en-US" altLang="ko-KR" b="1" dirty="0"/>
+              <a:t>Configuration of IndyRP2</a:t>
+            </a:r>
+            <a:endParaRPr lang="ko-KR" altLang="en-US" b="1" dirty="0"/>
+          </a:p>
+        </p:txBody>
+      </p:sp>
+      <p:pic>
+        <p:nvPicPr>
+          <p:cNvPr id="7" name="그림 6">
+            <a:extLst>
+              <a:ext uri="{FF2B5EF4-FFF2-40B4-BE49-F238E27FC236}">
+                <a16:creationId xmlns:a16="http://schemas.microsoft.com/office/drawing/2014/main" id="{46617864-9F9E-080A-9FF6-7867150D90F6}"/>
+              </a:ext>
+            </a:extLst>
+          </p:cNvPr>
+          <p:cNvPicPr>
+            <a:picLocks noChangeAspect="1"/>
+          </p:cNvPicPr>
+          <p:nvPr/>
+        </p:nvPicPr>
+        <p:blipFill>
+          <a:blip r:embed="rId2"/>
+          <a:stretch>
+            <a:fillRect/>
+          </a:stretch>
+        </p:blipFill>
+        <p:spPr>
+          <a:xfrm>
+            <a:off x="234034" y="1514410"/>
+            <a:ext cx="2618223" cy="5192990"/>
+          </a:xfrm>
+          <a:prstGeom prst="rect">
+            <a:avLst/>
+          </a:prstGeom>
+        </p:spPr>
+      </p:pic>
+      <p:sp>
+        <p:nvSpPr>
+          <p:cNvPr id="8" name="TextBox 7">
+            <a:extLst>
+              <a:ext uri="{FF2B5EF4-FFF2-40B4-BE49-F238E27FC236}">
+                <a16:creationId xmlns:a16="http://schemas.microsoft.com/office/drawing/2014/main" id="{E4CD7388-DD65-A02B-3D2B-2AF56C2514CB}"/>
+              </a:ext>
+            </a:extLst>
+          </p:cNvPr>
+          <p:cNvSpPr txBox="1"/>
+          <p:nvPr/>
+        </p:nvSpPr>
+        <p:spPr>
+          <a:xfrm>
+            <a:off x="7793372" y="1514410"/>
+            <a:ext cx="2035685" cy="1200329"/>
+          </a:xfrm>
+          <a:prstGeom prst="rect">
+            <a:avLst/>
+          </a:prstGeom>
+          <a:noFill/>
+        </p:spPr>
+        <p:txBody>
+          <a:bodyPr wrap="none" rtlCol="0">
+            <a:spAutoFit/>
+          </a:bodyPr>
+          <a:lstStyle/>
+          <a:p>
+            <a:pPr marL="285750" indent="-285750">
+              <a:buFont typeface="Arial" panose="020B0604020202020204" pitchFamily="34" charset="0"/>
+              <a:buChar char="•"/>
+            </a:pPr>
+            <a:r>
+              <a:rPr lang="en-US" altLang="ko-KR" b="1" dirty="0"/>
+              <a:t>Q: Quaternion</a:t>
+            </a:r>
+          </a:p>
+          <a:p>
+            <a:pPr marL="285750" indent="-285750">
+              <a:buFont typeface="Arial" panose="020B0604020202020204" pitchFamily="34" charset="0"/>
+              <a:buChar char="•"/>
+            </a:pPr>
+            <a:r>
+              <a:rPr lang="en-US" altLang="ko-KR" b="1" dirty="0"/>
+              <a:t>E: Euler</a:t>
+            </a:r>
+          </a:p>
+          <a:p>
+            <a:pPr marL="285750" indent="-285750">
+              <a:buFont typeface="Arial" panose="020B0604020202020204" pitchFamily="34" charset="0"/>
+              <a:buChar char="•"/>
+            </a:pPr>
+            <a:r>
+              <a:rPr lang="en-US" altLang="ko-KR" b="1" dirty="0"/>
+              <a:t>A: Axis-Angle</a:t>
+            </a:r>
+          </a:p>
+          <a:p>
+            <a:pPr marL="285750" indent="-285750">
+              <a:buFont typeface="Arial" panose="020B0604020202020204" pitchFamily="34" charset="0"/>
+              <a:buChar char="•"/>
+            </a:pPr>
+            <a:r>
+              <a:rPr lang="en-US" altLang="ko-KR" b="1" dirty="0"/>
+              <a:t>M: Matrix</a:t>
+            </a:r>
+            <a:endParaRPr lang="ko-KR" altLang="en-US" b="1" dirty="0"/>
+          </a:p>
+        </p:txBody>
+      </p:sp>
+      <p:sp>
+        <p:nvSpPr>
+          <p:cNvPr id="10" name="TextBox 9">
+            <a:extLst>
+              <a:ext uri="{FF2B5EF4-FFF2-40B4-BE49-F238E27FC236}">
+                <a16:creationId xmlns:a16="http://schemas.microsoft.com/office/drawing/2014/main" id="{91D2F5C4-5DD7-8731-E8C3-24FB4CA84A18}"/>
+              </a:ext>
+            </a:extLst>
+          </p:cNvPr>
+          <p:cNvSpPr txBox="1"/>
+          <p:nvPr/>
+        </p:nvSpPr>
+        <p:spPr>
+          <a:xfrm>
+            <a:off x="2852257" y="1514410"/>
+            <a:ext cx="3543977" cy="5262979"/>
+          </a:xfrm>
+          <a:prstGeom prst="rect">
+            <a:avLst/>
+          </a:prstGeom>
+          <a:noFill/>
+        </p:spPr>
+        <p:txBody>
+          <a:bodyPr wrap="square">
+            <a:spAutoFit/>
+          </a:bodyPr>
+          <a:lstStyle/>
+          <a:p>
+            <a:r>
+              <a:rPr lang="ko-KR" altLang="en-US" sz="800" dirty="0" err="1"/>
+              <a:t>Link</a:t>
+            </a:r>
+            <a:r>
+              <a:rPr lang="ko-KR" altLang="en-US" sz="800" dirty="0"/>
+              <a:t> 0 </a:t>
+            </a:r>
+            <a:r>
+              <a:rPr lang="ko-KR" altLang="en-US" sz="800" dirty="0" err="1"/>
+              <a:t>Info</a:t>
+            </a:r>
+            <a:r>
+              <a:rPr lang="ko-KR" altLang="en-US" sz="800" dirty="0"/>
+              <a:t>: </a:t>
+            </a:r>
+          </a:p>
+          <a:p>
+            <a:r>
+              <a:rPr lang="ko-KR" altLang="en-US" sz="800" dirty="0"/>
+              <a:t>-- </a:t>
+            </a:r>
+            <a:r>
+              <a:rPr lang="ko-KR" altLang="en-US" sz="800" dirty="0" err="1"/>
+              <a:t>Position</a:t>
+            </a:r>
+            <a:r>
+              <a:rPr lang="ko-KR" altLang="en-US" sz="800" dirty="0"/>
+              <a:t>:  [0.0, 0.0, 0.08]</a:t>
+            </a:r>
+          </a:p>
+          <a:p>
+            <a:r>
+              <a:rPr lang="ko-KR" altLang="en-US" sz="800" dirty="0"/>
+              <a:t>-- </a:t>
+            </a:r>
+            <a:r>
+              <a:rPr lang="ko-KR" altLang="en-US" sz="800" dirty="0" err="1"/>
+              <a:t>Orientation</a:t>
+            </a:r>
+            <a:r>
+              <a:rPr lang="ko-KR" altLang="en-US" sz="800" dirty="0"/>
+              <a:t>(</a:t>
+            </a:r>
+            <a:r>
+              <a:rPr lang="ko-KR" altLang="en-US" sz="800" dirty="0" err="1"/>
+              <a:t>Q</a:t>
+            </a:r>
+            <a:r>
+              <a:rPr lang="ko-KR" altLang="en-US" sz="800" dirty="0"/>
+              <a:t>):  [0.0, 0.0, -0.0, 1.0]</a:t>
+            </a:r>
+          </a:p>
+          <a:p>
+            <a:r>
+              <a:rPr lang="ko-KR" altLang="en-US" sz="800" dirty="0"/>
+              <a:t>-- </a:t>
+            </a:r>
+            <a:r>
+              <a:rPr lang="ko-KR" altLang="en-US" sz="800" dirty="0" err="1"/>
+              <a:t>Orientation</a:t>
+            </a:r>
+            <a:r>
+              <a:rPr lang="ko-KR" altLang="en-US" sz="800" dirty="0"/>
+              <a:t>(</a:t>
+            </a:r>
+            <a:r>
+              <a:rPr lang="ko-KR" altLang="en-US" sz="800" dirty="0" err="1"/>
+              <a:t>E</a:t>
+            </a:r>
+            <a:r>
+              <a:rPr lang="ko-KR" altLang="en-US" sz="800" dirty="0"/>
+              <a:t>):  [0.0, 0.0, -0.0]</a:t>
+            </a:r>
+          </a:p>
+          <a:p>
+            <a:r>
+              <a:rPr lang="ko-KR" altLang="en-US" sz="800" dirty="0"/>
+              <a:t>-- </a:t>
+            </a:r>
+            <a:r>
+              <a:rPr lang="ko-KR" altLang="en-US" sz="800" dirty="0" err="1"/>
+              <a:t>Orientation</a:t>
+            </a:r>
+            <a:r>
+              <a:rPr lang="ko-KR" altLang="en-US" sz="800" dirty="0"/>
+              <a:t>(</a:t>
+            </a:r>
+            <a:r>
+              <a:rPr lang="ko-KR" altLang="en-US" sz="800" dirty="0" err="1"/>
+              <a:t>A</a:t>
+            </a:r>
+            <a:r>
+              <a:rPr lang="ko-KR" altLang="en-US" sz="800" dirty="0"/>
+              <a:t>):  [1.0, 0.0, 0.0] 0.0</a:t>
+            </a:r>
+          </a:p>
+          <a:p>
+            <a:r>
+              <a:rPr lang="ko-KR" altLang="en-US" sz="800" dirty="0"/>
+              <a:t>-- </a:t>
+            </a:r>
+            <a:r>
+              <a:rPr lang="ko-KR" altLang="en-US" sz="800" dirty="0" err="1"/>
+              <a:t>Orientation</a:t>
+            </a:r>
+            <a:r>
+              <a:rPr lang="ko-KR" altLang="en-US" sz="800" dirty="0"/>
+              <a:t>(</a:t>
+            </a:r>
+            <a:r>
+              <a:rPr lang="ko-KR" altLang="en-US" sz="800" dirty="0" err="1"/>
+              <a:t>M</a:t>
+            </a:r>
+            <a:r>
+              <a:rPr lang="ko-KR" altLang="en-US" sz="800" dirty="0"/>
+              <a:t>):  [1.0, 0.0, 0.0, -0.0, 1.0, -0.0, -0.0, 0.0, 1.0]</a:t>
+            </a:r>
+          </a:p>
+          <a:p>
+            <a:r>
+              <a:rPr lang="ko-KR" altLang="en-US" sz="800" dirty="0" err="1"/>
+              <a:t>Link</a:t>
+            </a:r>
+            <a:r>
+              <a:rPr lang="ko-KR" altLang="en-US" sz="800" dirty="0"/>
+              <a:t> 1 </a:t>
+            </a:r>
+            <a:r>
+              <a:rPr lang="ko-KR" altLang="en-US" sz="800" dirty="0" err="1"/>
+              <a:t>Info</a:t>
+            </a:r>
+            <a:r>
+              <a:rPr lang="ko-KR" altLang="en-US" sz="800" dirty="0"/>
+              <a:t>: </a:t>
+            </a:r>
+          </a:p>
+          <a:p>
+            <a:r>
+              <a:rPr lang="ko-KR" altLang="en-US" sz="800" dirty="0"/>
+              <a:t>-- </a:t>
+            </a:r>
+            <a:r>
+              <a:rPr lang="ko-KR" altLang="en-US" sz="800" dirty="0" err="1"/>
+              <a:t>Position</a:t>
+            </a:r>
+            <a:r>
+              <a:rPr lang="ko-KR" altLang="en-US" sz="800" dirty="0"/>
+              <a:t>:  [-0.0, -0.11, 0.3]</a:t>
+            </a:r>
+          </a:p>
+          <a:p>
+            <a:r>
+              <a:rPr lang="ko-KR" altLang="en-US" sz="800" dirty="0"/>
+              <a:t>-- </a:t>
+            </a:r>
+            <a:r>
+              <a:rPr lang="ko-KR" altLang="en-US" sz="800" dirty="0" err="1"/>
+              <a:t>Orientation</a:t>
+            </a:r>
+            <a:r>
+              <a:rPr lang="ko-KR" altLang="en-US" sz="800" dirty="0"/>
+              <a:t>(</a:t>
+            </a:r>
+            <a:r>
+              <a:rPr lang="ko-KR" altLang="en-US" sz="800" dirty="0" err="1"/>
+              <a:t>Q</a:t>
+            </a:r>
+            <a:r>
+              <a:rPr lang="ko-KR" altLang="en-US" sz="800" dirty="0"/>
+              <a:t>):  [0.5, 0.5, -0.5, 0.5]</a:t>
+            </a:r>
+          </a:p>
+          <a:p>
+            <a:r>
+              <a:rPr lang="ko-KR" altLang="en-US" sz="800" dirty="0"/>
+              <a:t>-- </a:t>
+            </a:r>
+            <a:r>
+              <a:rPr lang="ko-KR" altLang="en-US" sz="800" dirty="0" err="1"/>
+              <a:t>Orientation</a:t>
+            </a:r>
+            <a:r>
+              <a:rPr lang="ko-KR" altLang="en-US" sz="800" dirty="0"/>
+              <a:t>(</a:t>
+            </a:r>
+            <a:r>
+              <a:rPr lang="ko-KR" altLang="en-US" sz="800" dirty="0" err="1"/>
+              <a:t>E</a:t>
+            </a:r>
+            <a:r>
+              <a:rPr lang="ko-KR" altLang="en-US" sz="800" dirty="0"/>
+              <a:t>):  [0.0, 90.0, -90.0]</a:t>
+            </a:r>
+          </a:p>
+          <a:p>
+            <a:r>
+              <a:rPr lang="ko-KR" altLang="en-US" sz="800" dirty="0"/>
+              <a:t>-- </a:t>
+            </a:r>
+            <a:r>
+              <a:rPr lang="ko-KR" altLang="en-US" sz="800" dirty="0" err="1"/>
+              <a:t>Orientation</a:t>
+            </a:r>
+            <a:r>
+              <a:rPr lang="ko-KR" altLang="en-US" sz="800" dirty="0"/>
+              <a:t>(</a:t>
+            </a:r>
+            <a:r>
+              <a:rPr lang="ko-KR" altLang="en-US" sz="800" dirty="0" err="1"/>
+              <a:t>A</a:t>
+            </a:r>
+            <a:r>
+              <a:rPr lang="ko-KR" altLang="en-US" sz="800" dirty="0"/>
+              <a:t>):  [0.57735, 0.57735, -0.57735] 120.0</a:t>
+            </a:r>
+          </a:p>
+          <a:p>
+            <a:r>
+              <a:rPr lang="ko-KR" altLang="en-US" sz="800" dirty="0"/>
+              <a:t>-- </a:t>
+            </a:r>
+            <a:r>
+              <a:rPr lang="ko-KR" altLang="en-US" sz="800" dirty="0" err="1"/>
+              <a:t>Orientation</a:t>
+            </a:r>
+            <a:r>
+              <a:rPr lang="ko-KR" altLang="en-US" sz="800" dirty="0"/>
+              <a:t>(</a:t>
+            </a:r>
+            <a:r>
+              <a:rPr lang="ko-KR" altLang="en-US" sz="800" dirty="0" err="1"/>
+              <a:t>M</a:t>
+            </a:r>
+            <a:r>
+              <a:rPr lang="ko-KR" altLang="en-US" sz="800" dirty="0"/>
+              <a:t>):  [0.0, 1.0, 0.0, 0.0, 0.0, -1.0, -1.0, 0.0, 0.0]</a:t>
+            </a:r>
+          </a:p>
+          <a:p>
+            <a:r>
+              <a:rPr lang="ko-KR" altLang="en-US" sz="800" dirty="0" err="1"/>
+              <a:t>Link</a:t>
+            </a:r>
+            <a:r>
+              <a:rPr lang="ko-KR" altLang="en-US" sz="800" dirty="0"/>
+              <a:t> 2 </a:t>
+            </a:r>
+            <a:r>
+              <a:rPr lang="ko-KR" altLang="en-US" sz="800" dirty="0" err="1"/>
+              <a:t>Info</a:t>
+            </a:r>
+            <a:r>
+              <a:rPr lang="ko-KR" altLang="en-US" sz="800" dirty="0"/>
+              <a:t>: </a:t>
+            </a:r>
+          </a:p>
+          <a:p>
+            <a:r>
+              <a:rPr lang="ko-KR" altLang="en-US" sz="800" dirty="0"/>
+              <a:t>-- </a:t>
+            </a:r>
+            <a:r>
+              <a:rPr lang="ko-KR" altLang="en-US" sz="800" dirty="0" err="1"/>
+              <a:t>Position</a:t>
+            </a:r>
+            <a:r>
+              <a:rPr lang="ko-KR" altLang="en-US" sz="800" dirty="0"/>
+              <a:t>:  [-0.0, -0.19, 0.68]</a:t>
+            </a:r>
+          </a:p>
+          <a:p>
+            <a:r>
+              <a:rPr lang="ko-KR" altLang="en-US" sz="800" dirty="0"/>
+              <a:t>-- </a:t>
+            </a:r>
+            <a:r>
+              <a:rPr lang="ko-KR" altLang="en-US" sz="800" dirty="0" err="1"/>
+              <a:t>Orientation</a:t>
+            </a:r>
+            <a:r>
+              <a:rPr lang="ko-KR" altLang="en-US" sz="800" dirty="0"/>
+              <a:t>(</a:t>
+            </a:r>
+            <a:r>
+              <a:rPr lang="ko-KR" altLang="en-US" sz="800" dirty="0" err="1"/>
+              <a:t>Q</a:t>
+            </a:r>
+            <a:r>
+              <a:rPr lang="ko-KR" altLang="en-US" sz="800" dirty="0"/>
+              <a:t>):  [0.0, 0.0, 0.0, 1.0]</a:t>
+            </a:r>
+          </a:p>
+          <a:p>
+            <a:r>
+              <a:rPr lang="ko-KR" altLang="en-US" sz="800" dirty="0"/>
+              <a:t>-- </a:t>
+            </a:r>
+            <a:r>
+              <a:rPr lang="ko-KR" altLang="en-US" sz="800" dirty="0" err="1"/>
+              <a:t>Orientation</a:t>
+            </a:r>
+            <a:r>
+              <a:rPr lang="ko-KR" altLang="en-US" sz="800" dirty="0"/>
+              <a:t>(</a:t>
+            </a:r>
+            <a:r>
+              <a:rPr lang="ko-KR" altLang="en-US" sz="800" dirty="0" err="1"/>
+              <a:t>E</a:t>
+            </a:r>
+            <a:r>
+              <a:rPr lang="ko-KR" altLang="en-US" sz="800" dirty="0"/>
+              <a:t>):  [0.0, -0.0, 0.0]</a:t>
+            </a:r>
+          </a:p>
+          <a:p>
+            <a:r>
+              <a:rPr lang="ko-KR" altLang="en-US" sz="800" dirty="0"/>
+              <a:t>-- </a:t>
+            </a:r>
+            <a:r>
+              <a:rPr lang="ko-KR" altLang="en-US" sz="800" dirty="0" err="1"/>
+              <a:t>Orientation</a:t>
+            </a:r>
+            <a:r>
+              <a:rPr lang="ko-KR" altLang="en-US" sz="800" dirty="0"/>
+              <a:t>(</a:t>
+            </a:r>
+            <a:r>
+              <a:rPr lang="ko-KR" altLang="en-US" sz="800" dirty="0" err="1"/>
+              <a:t>A</a:t>
+            </a:r>
+            <a:r>
+              <a:rPr lang="ko-KR" altLang="en-US" sz="800" dirty="0"/>
+              <a:t>):  [1.0, 0.0, 0.0] 0.0</a:t>
+            </a:r>
+          </a:p>
+          <a:p>
+            <a:r>
+              <a:rPr lang="ko-KR" altLang="en-US" sz="800" dirty="0"/>
+              <a:t>-- </a:t>
+            </a:r>
+            <a:r>
+              <a:rPr lang="ko-KR" altLang="en-US" sz="800" dirty="0" err="1"/>
+              <a:t>Orientation</a:t>
+            </a:r>
+            <a:r>
+              <a:rPr lang="ko-KR" altLang="en-US" sz="800" dirty="0"/>
+              <a:t>(</a:t>
+            </a:r>
+            <a:r>
+              <a:rPr lang="ko-KR" altLang="en-US" sz="800" dirty="0" err="1"/>
+              <a:t>M</a:t>
+            </a:r>
+            <a:r>
+              <a:rPr lang="ko-KR" altLang="en-US" sz="800" dirty="0"/>
+              <a:t>):  [1.0, -0.0, 0.0, 0.0, 1.0, -0.0, 0.0, 0.0, 1.0]</a:t>
+            </a:r>
+          </a:p>
+          <a:p>
+            <a:r>
+              <a:rPr lang="ko-KR" altLang="en-US" sz="800" dirty="0" err="1"/>
+              <a:t>Link</a:t>
+            </a:r>
+            <a:r>
+              <a:rPr lang="ko-KR" altLang="en-US" sz="800" dirty="0"/>
+              <a:t> 3 </a:t>
+            </a:r>
+            <a:r>
+              <a:rPr lang="ko-KR" altLang="en-US" sz="800" dirty="0" err="1"/>
+              <a:t>Info</a:t>
+            </a:r>
+            <a:r>
+              <a:rPr lang="ko-KR" altLang="en-US" sz="800" dirty="0"/>
+              <a:t>: </a:t>
+            </a:r>
+          </a:p>
+          <a:p>
+            <a:r>
+              <a:rPr lang="ko-KR" altLang="en-US" sz="800" dirty="0"/>
+              <a:t>-- </a:t>
+            </a:r>
+            <a:r>
+              <a:rPr lang="ko-KR" altLang="en-US" sz="800" dirty="0" err="1"/>
+              <a:t>Position</a:t>
+            </a:r>
+            <a:r>
+              <a:rPr lang="ko-KR" altLang="en-US" sz="800" dirty="0"/>
+              <a:t>:  [-0.0, -0.08, 0.75]</a:t>
+            </a:r>
+          </a:p>
+          <a:p>
+            <a:r>
+              <a:rPr lang="ko-KR" altLang="en-US" sz="800" dirty="0"/>
+              <a:t>-- </a:t>
+            </a:r>
+            <a:r>
+              <a:rPr lang="ko-KR" altLang="en-US" sz="800" dirty="0" err="1"/>
+              <a:t>Orientation</a:t>
+            </a:r>
+            <a:r>
+              <a:rPr lang="ko-KR" altLang="en-US" sz="800" dirty="0"/>
+              <a:t>(</a:t>
+            </a:r>
+            <a:r>
+              <a:rPr lang="ko-KR" altLang="en-US" sz="800" dirty="0" err="1"/>
+              <a:t>Q</a:t>
+            </a:r>
+            <a:r>
+              <a:rPr lang="ko-KR" altLang="en-US" sz="800" dirty="0"/>
+              <a:t>):  [0.5, 0.5, -0.5, 0.5]</a:t>
+            </a:r>
+          </a:p>
+          <a:p>
+            <a:r>
+              <a:rPr lang="ko-KR" altLang="en-US" sz="800" dirty="0"/>
+              <a:t>-- </a:t>
+            </a:r>
+            <a:r>
+              <a:rPr lang="ko-KR" altLang="en-US" sz="800" dirty="0" err="1"/>
+              <a:t>Orientation</a:t>
+            </a:r>
+            <a:r>
+              <a:rPr lang="ko-KR" altLang="en-US" sz="800" dirty="0"/>
+              <a:t>(</a:t>
+            </a:r>
+            <a:r>
+              <a:rPr lang="ko-KR" altLang="en-US" sz="800" dirty="0" err="1"/>
+              <a:t>E</a:t>
+            </a:r>
+            <a:r>
+              <a:rPr lang="ko-KR" altLang="en-US" sz="800" dirty="0"/>
+              <a:t>):  [0.0, 90.0, -90.0]</a:t>
+            </a:r>
+          </a:p>
+          <a:p>
+            <a:r>
+              <a:rPr lang="ko-KR" altLang="en-US" sz="800" dirty="0"/>
+              <a:t>-- </a:t>
+            </a:r>
+            <a:r>
+              <a:rPr lang="ko-KR" altLang="en-US" sz="800" dirty="0" err="1"/>
+              <a:t>Orientation</a:t>
+            </a:r>
+            <a:r>
+              <a:rPr lang="ko-KR" altLang="en-US" sz="800" dirty="0"/>
+              <a:t>(</a:t>
+            </a:r>
+            <a:r>
+              <a:rPr lang="ko-KR" altLang="en-US" sz="800" dirty="0" err="1"/>
+              <a:t>A</a:t>
+            </a:r>
+            <a:r>
+              <a:rPr lang="ko-KR" altLang="en-US" sz="800" dirty="0"/>
+              <a:t>):  [0.57735, 0.57735, -0.57735] 120.0</a:t>
+            </a:r>
+          </a:p>
+          <a:p>
+            <a:r>
+              <a:rPr lang="ko-KR" altLang="en-US" sz="800" dirty="0"/>
+              <a:t>-- </a:t>
+            </a:r>
+            <a:r>
+              <a:rPr lang="ko-KR" altLang="en-US" sz="800" dirty="0" err="1"/>
+              <a:t>Orientation</a:t>
+            </a:r>
+            <a:r>
+              <a:rPr lang="ko-KR" altLang="en-US" sz="800" dirty="0"/>
+              <a:t>(</a:t>
+            </a:r>
+            <a:r>
+              <a:rPr lang="ko-KR" altLang="en-US" sz="800" dirty="0" err="1"/>
+              <a:t>M</a:t>
+            </a:r>
+            <a:r>
+              <a:rPr lang="ko-KR" altLang="en-US" sz="800" dirty="0"/>
+              <a:t>):  [0.0, 1.0, 0.0, 0.0, 0.0, -1.0, -1.0, 0.0, -0.0]</a:t>
+            </a:r>
+          </a:p>
+          <a:p>
+            <a:r>
+              <a:rPr lang="ko-KR" altLang="en-US" sz="800" dirty="0" err="1"/>
+              <a:t>Link</a:t>
+            </a:r>
+            <a:r>
+              <a:rPr lang="ko-KR" altLang="en-US" sz="800" dirty="0"/>
+              <a:t> 4 </a:t>
+            </a:r>
+            <a:r>
+              <a:rPr lang="ko-KR" altLang="en-US" sz="800" dirty="0" err="1"/>
+              <a:t>Info</a:t>
+            </a:r>
+            <a:r>
+              <a:rPr lang="ko-KR" altLang="en-US" sz="800" dirty="0"/>
+              <a:t>: </a:t>
+            </a:r>
+          </a:p>
+          <a:p>
+            <a:r>
+              <a:rPr lang="ko-KR" altLang="en-US" sz="800" dirty="0"/>
+              <a:t>-- </a:t>
+            </a:r>
+            <a:r>
+              <a:rPr lang="ko-KR" altLang="en-US" sz="800" dirty="0" err="1"/>
+              <a:t>Position</a:t>
+            </a:r>
+            <a:r>
+              <a:rPr lang="ko-KR" altLang="en-US" sz="800" dirty="0"/>
+              <a:t>:  [-0.0, -0.0, 1.02]</a:t>
+            </a:r>
+          </a:p>
+          <a:p>
+            <a:r>
+              <a:rPr lang="ko-KR" altLang="en-US" sz="800" dirty="0"/>
+              <a:t>-- </a:t>
+            </a:r>
+            <a:r>
+              <a:rPr lang="ko-KR" altLang="en-US" sz="800" dirty="0" err="1"/>
+              <a:t>Orientation</a:t>
+            </a:r>
+            <a:r>
+              <a:rPr lang="ko-KR" altLang="en-US" sz="800" dirty="0"/>
+              <a:t>(</a:t>
+            </a:r>
+            <a:r>
+              <a:rPr lang="ko-KR" altLang="en-US" sz="800" dirty="0" err="1"/>
+              <a:t>Q</a:t>
+            </a:r>
+            <a:r>
+              <a:rPr lang="ko-KR" altLang="en-US" sz="800" dirty="0"/>
+              <a:t>):  [0.0, -0.0, 0.0, 1.0]</a:t>
+            </a:r>
+          </a:p>
+          <a:p>
+            <a:r>
+              <a:rPr lang="ko-KR" altLang="en-US" sz="800" dirty="0"/>
+              <a:t>-- </a:t>
+            </a:r>
+            <a:r>
+              <a:rPr lang="ko-KR" altLang="en-US" sz="800" dirty="0" err="1"/>
+              <a:t>Orientation</a:t>
+            </a:r>
+            <a:r>
+              <a:rPr lang="ko-KR" altLang="en-US" sz="800" dirty="0"/>
+              <a:t>(</a:t>
+            </a:r>
+            <a:r>
+              <a:rPr lang="ko-KR" altLang="en-US" sz="800" dirty="0" err="1"/>
+              <a:t>E</a:t>
+            </a:r>
+            <a:r>
+              <a:rPr lang="ko-KR" altLang="en-US" sz="800" dirty="0"/>
+              <a:t>):  [0.0, -0.0, 0.0]</a:t>
+            </a:r>
+          </a:p>
+          <a:p>
+            <a:r>
+              <a:rPr lang="ko-KR" altLang="en-US" sz="800" dirty="0"/>
+              <a:t>-- </a:t>
+            </a:r>
+            <a:r>
+              <a:rPr lang="ko-KR" altLang="en-US" sz="800" dirty="0" err="1"/>
+              <a:t>Orientation</a:t>
+            </a:r>
+            <a:r>
+              <a:rPr lang="ko-KR" altLang="en-US" sz="800" dirty="0"/>
+              <a:t>(</a:t>
+            </a:r>
+            <a:r>
+              <a:rPr lang="ko-KR" altLang="en-US" sz="800" dirty="0" err="1"/>
+              <a:t>A</a:t>
+            </a:r>
+            <a:r>
+              <a:rPr lang="ko-KR" altLang="en-US" sz="800" dirty="0"/>
+              <a:t>):  [1.0, 0.0, 0.0] 0.0</a:t>
+            </a:r>
+          </a:p>
+          <a:p>
+            <a:r>
+              <a:rPr lang="ko-KR" altLang="en-US" sz="800" dirty="0"/>
+              <a:t>-- </a:t>
+            </a:r>
+            <a:r>
+              <a:rPr lang="ko-KR" altLang="en-US" sz="800" dirty="0" err="1"/>
+              <a:t>Orientation</a:t>
+            </a:r>
+            <a:r>
+              <a:rPr lang="ko-KR" altLang="en-US" sz="800" dirty="0"/>
+              <a:t>(</a:t>
+            </a:r>
+            <a:r>
+              <a:rPr lang="ko-KR" altLang="en-US" sz="800" dirty="0" err="1"/>
+              <a:t>M</a:t>
+            </a:r>
+            <a:r>
+              <a:rPr lang="ko-KR" altLang="en-US" sz="800" dirty="0"/>
+              <a:t>):  [1.0, -0.0, -0.0, 0.0, 1.0, -0.0, 0.0, 0.0, 1.0]</a:t>
+            </a:r>
+          </a:p>
+          <a:p>
+            <a:r>
+              <a:rPr lang="ko-KR" altLang="en-US" sz="800" dirty="0" err="1"/>
+              <a:t>Link</a:t>
+            </a:r>
+            <a:r>
+              <a:rPr lang="ko-KR" altLang="en-US" sz="800" dirty="0"/>
+              <a:t> 5 </a:t>
+            </a:r>
+            <a:r>
+              <a:rPr lang="ko-KR" altLang="en-US" sz="800" dirty="0" err="1"/>
+              <a:t>Info</a:t>
+            </a:r>
+            <a:r>
+              <a:rPr lang="ko-KR" altLang="en-US" sz="800" dirty="0"/>
+              <a:t>: </a:t>
+            </a:r>
+          </a:p>
+          <a:p>
+            <a:r>
+              <a:rPr lang="ko-KR" altLang="en-US" sz="800" dirty="0"/>
+              <a:t>-- </a:t>
+            </a:r>
+            <a:r>
+              <a:rPr lang="ko-KR" altLang="en-US" sz="800" dirty="0" err="1"/>
+              <a:t>Position</a:t>
+            </a:r>
+            <a:r>
+              <a:rPr lang="ko-KR" altLang="en-US" sz="800" dirty="0"/>
+              <a:t>:  [-0.0, -0.12, 1.1]</a:t>
+            </a:r>
+          </a:p>
+          <a:p>
+            <a:r>
+              <a:rPr lang="ko-KR" altLang="en-US" sz="800" dirty="0"/>
+              <a:t>-- </a:t>
+            </a:r>
+            <a:r>
+              <a:rPr lang="ko-KR" altLang="en-US" sz="800" dirty="0" err="1"/>
+              <a:t>Orientation</a:t>
+            </a:r>
+            <a:r>
+              <a:rPr lang="ko-KR" altLang="en-US" sz="800" dirty="0"/>
+              <a:t>(</a:t>
+            </a:r>
+            <a:r>
+              <a:rPr lang="ko-KR" altLang="en-US" sz="800" dirty="0" err="1"/>
+              <a:t>Q</a:t>
+            </a:r>
+            <a:r>
+              <a:rPr lang="ko-KR" altLang="en-US" sz="800" dirty="0"/>
+              <a:t>):  [0.5, 0.5, -0.5, 0.5]</a:t>
+            </a:r>
+          </a:p>
+          <a:p>
+            <a:r>
+              <a:rPr lang="ko-KR" altLang="en-US" sz="800" dirty="0"/>
+              <a:t>-- </a:t>
+            </a:r>
+            <a:r>
+              <a:rPr lang="ko-KR" altLang="en-US" sz="800" dirty="0" err="1"/>
+              <a:t>Orientation</a:t>
+            </a:r>
+            <a:r>
+              <a:rPr lang="ko-KR" altLang="en-US" sz="800" dirty="0"/>
+              <a:t>(</a:t>
+            </a:r>
+            <a:r>
+              <a:rPr lang="ko-KR" altLang="en-US" sz="800" dirty="0" err="1"/>
+              <a:t>E</a:t>
+            </a:r>
+            <a:r>
+              <a:rPr lang="ko-KR" altLang="en-US" sz="800" dirty="0"/>
+              <a:t>):  [0.0, 90.0, -90.0]</a:t>
+            </a:r>
+          </a:p>
+          <a:p>
+            <a:r>
+              <a:rPr lang="ko-KR" altLang="en-US" sz="800" dirty="0"/>
+              <a:t>-- </a:t>
+            </a:r>
+            <a:r>
+              <a:rPr lang="ko-KR" altLang="en-US" sz="800" dirty="0" err="1"/>
+              <a:t>Orientation</a:t>
+            </a:r>
+            <a:r>
+              <a:rPr lang="ko-KR" altLang="en-US" sz="800" dirty="0"/>
+              <a:t>(</a:t>
+            </a:r>
+            <a:r>
+              <a:rPr lang="ko-KR" altLang="en-US" sz="800" dirty="0" err="1"/>
+              <a:t>A</a:t>
+            </a:r>
+            <a:r>
+              <a:rPr lang="ko-KR" altLang="en-US" sz="800" dirty="0"/>
+              <a:t>):  [0.57735, 0.57735, -0.57735] 120.0</a:t>
+            </a:r>
+          </a:p>
+          <a:p>
+            <a:r>
+              <a:rPr lang="ko-KR" altLang="en-US" sz="800" dirty="0"/>
+              <a:t>-- </a:t>
+            </a:r>
+            <a:r>
+              <a:rPr lang="ko-KR" altLang="en-US" sz="800" dirty="0" err="1"/>
+              <a:t>Orientation</a:t>
+            </a:r>
+            <a:r>
+              <a:rPr lang="ko-KR" altLang="en-US" sz="800" dirty="0"/>
+              <a:t>(</a:t>
+            </a:r>
+            <a:r>
+              <a:rPr lang="ko-KR" altLang="en-US" sz="800" dirty="0" err="1"/>
+              <a:t>M</a:t>
+            </a:r>
+            <a:r>
+              <a:rPr lang="ko-KR" altLang="en-US" sz="800" dirty="0"/>
+              <a:t>):  [0.0, 1.0, 0.0, 0.0, 0.0, -1.0, -1.0, 0.0, -0.0]</a:t>
+            </a:r>
+          </a:p>
+          <a:p>
+            <a:r>
+              <a:rPr lang="ko-KR" altLang="en-US" sz="800" dirty="0" err="1"/>
+              <a:t>Link</a:t>
+            </a:r>
+            <a:r>
+              <a:rPr lang="ko-KR" altLang="en-US" sz="800" dirty="0"/>
+              <a:t> 6 </a:t>
+            </a:r>
+            <a:r>
+              <a:rPr lang="ko-KR" altLang="en-US" sz="800" dirty="0" err="1"/>
+              <a:t>Info</a:t>
+            </a:r>
+            <a:r>
+              <a:rPr lang="ko-KR" altLang="en-US" sz="800" dirty="0"/>
+              <a:t>: </a:t>
+            </a:r>
+          </a:p>
+          <a:p>
+            <a:r>
+              <a:rPr lang="ko-KR" altLang="en-US" sz="800" dirty="0"/>
+              <a:t>-- </a:t>
+            </a:r>
+            <a:r>
+              <a:rPr lang="ko-KR" altLang="en-US" sz="800" dirty="0" err="1"/>
+              <a:t>Position</a:t>
+            </a:r>
+            <a:r>
+              <a:rPr lang="ko-KR" altLang="en-US" sz="800" dirty="0"/>
+              <a:t>:  [-0.0, -0.19, 1.27]</a:t>
+            </a:r>
+          </a:p>
+          <a:p>
+            <a:r>
+              <a:rPr lang="ko-KR" altLang="en-US" sz="800" dirty="0"/>
+              <a:t>-- </a:t>
+            </a:r>
+            <a:r>
+              <a:rPr lang="ko-KR" altLang="en-US" sz="800" dirty="0" err="1"/>
+              <a:t>Orientation</a:t>
+            </a:r>
+            <a:r>
+              <a:rPr lang="ko-KR" altLang="en-US" sz="800" dirty="0"/>
+              <a:t>(</a:t>
+            </a:r>
+            <a:r>
+              <a:rPr lang="ko-KR" altLang="en-US" sz="800" dirty="0" err="1"/>
+              <a:t>Q</a:t>
+            </a:r>
+            <a:r>
+              <a:rPr lang="ko-KR" altLang="en-US" sz="800" dirty="0"/>
+              <a:t>):  [0.0, -0.0, 0.0, 1.0]</a:t>
+            </a:r>
+          </a:p>
+          <a:p>
+            <a:r>
+              <a:rPr lang="ko-KR" altLang="en-US" sz="800" dirty="0"/>
+              <a:t>-- </a:t>
+            </a:r>
+            <a:r>
+              <a:rPr lang="ko-KR" altLang="en-US" sz="800" dirty="0" err="1"/>
+              <a:t>Orientation</a:t>
+            </a:r>
+            <a:r>
+              <a:rPr lang="ko-KR" altLang="en-US" sz="800" dirty="0"/>
+              <a:t>(</a:t>
+            </a:r>
+            <a:r>
+              <a:rPr lang="ko-KR" altLang="en-US" sz="800" dirty="0" err="1"/>
+              <a:t>E</a:t>
+            </a:r>
+            <a:r>
+              <a:rPr lang="ko-KR" altLang="en-US" sz="800" dirty="0"/>
+              <a:t>):  [0.0, -0.0, 0.0]</a:t>
+            </a:r>
+          </a:p>
+          <a:p>
+            <a:r>
+              <a:rPr lang="ko-KR" altLang="en-US" sz="800" dirty="0"/>
+              <a:t>-- </a:t>
+            </a:r>
+            <a:r>
+              <a:rPr lang="ko-KR" altLang="en-US" sz="800" dirty="0" err="1"/>
+              <a:t>Orientation</a:t>
+            </a:r>
+            <a:r>
+              <a:rPr lang="ko-KR" altLang="en-US" sz="800" dirty="0"/>
+              <a:t>(</a:t>
+            </a:r>
+            <a:r>
+              <a:rPr lang="ko-KR" altLang="en-US" sz="800" dirty="0" err="1"/>
+              <a:t>A</a:t>
+            </a:r>
+            <a:r>
+              <a:rPr lang="ko-KR" altLang="en-US" sz="800" dirty="0"/>
+              <a:t>):  [1.0, 0.0, 0.0] 0.0</a:t>
+            </a:r>
+          </a:p>
+          <a:p>
+            <a:r>
+              <a:rPr lang="ko-KR" altLang="en-US" sz="800" dirty="0"/>
+              <a:t>-- </a:t>
+            </a:r>
+            <a:r>
+              <a:rPr lang="ko-KR" altLang="en-US" sz="800" dirty="0" err="1"/>
+              <a:t>Orientation</a:t>
+            </a:r>
+            <a:r>
+              <a:rPr lang="ko-KR" altLang="en-US" sz="800" dirty="0"/>
+              <a:t>(</a:t>
+            </a:r>
+            <a:r>
+              <a:rPr lang="ko-KR" altLang="en-US" sz="800" dirty="0" err="1"/>
+              <a:t>M</a:t>
+            </a:r>
+            <a:r>
+              <a:rPr lang="ko-KR" altLang="en-US" sz="800" dirty="0"/>
+              <a:t>):  [1.0, -0.0, -0.0, 0.0, 1.0, -0.0, 0.0, 0.0, 1.0]</a:t>
+            </a:r>
+          </a:p>
+        </p:txBody>
+      </p:sp>
+    </p:spTree>
+    <p:extLst>
+      <p:ext uri="{BB962C8B-B14F-4D97-AF65-F5344CB8AC3E}">
+        <p14:creationId xmlns:p14="http://schemas.microsoft.com/office/powerpoint/2010/main" val="500037662"/>
+      </p:ext>
+    </p:extLst>
+  </p:cSld>
+  <p:clrMapOvr>
+    <a:masterClrMapping/>
+  </p:clrMapOvr>
+</p:sld>
+</file>
+
+<file path=ppt/slides/slide4.xml><?xml version="1.0" encoding="utf-8"?>
+<p:sld xmlns:a="http://schemas.openxmlformats.org/drawingml/2006/main" xmlns:r="http://schemas.openxmlformats.org/officeDocument/2006/relationships" xmlns:p="http://schemas.openxmlformats.org/presentationml/2006/main">
+  <p:cSld>
+    <p:spTree>
+      <p:nvGrpSpPr>
+        <p:cNvPr id="1" name=""/>
+        <p:cNvGrpSpPr/>
+        <p:nvPr/>
+      </p:nvGrpSpPr>
+      <p:grpSpPr>
+        <a:xfrm>
+          <a:off x="0" y="0"/>
+          <a:ext cx="0" cy="0"/>
+          <a:chOff x="0" y="0"/>
+          <a:chExt cx="0" cy="0"/>
+        </a:xfrm>
+      </p:grpSpPr>
+      <p:sp>
+        <p:nvSpPr>
+          <p:cNvPr id="2" name="제목 1">
+            <a:extLst>
+              <a:ext uri="{FF2B5EF4-FFF2-40B4-BE49-F238E27FC236}">
                 <a16:creationId xmlns:a16="http://schemas.microsoft.com/office/drawing/2014/main" id="{78AE6E24-2E64-2241-90C9-B72A4DAAE321}"/>
               </a:ext>
             </a:extLst>
@@ -5073,7 +5622,7 @@
                 <a:effectLst/>
                 <a:latin typeface="Consolas" panose="020B0609020204030204" pitchFamily="49" charset="0"/>
               </a:rPr>
-              <a:t>[0, -0.1864, 1.367]</a:t>
+              <a:t>[0, -0.1864, 1.327]</a:t>
             </a:r>
           </a:p>
         </p:txBody>
@@ -5115,44 +5664,349 @@
                 <a:latin typeface="맑은 고딕" panose="020B0503020000020004" pitchFamily="50" charset="-127"/>
                 <a:ea typeface="맑은 고딕" panose="020B0503020000020004" pitchFamily="50" charset="-127"/>
               </a:rPr>
-              <a:t>H7=0.100(</a:t>
-            </a:r>
-            <a:r>
-              <a:rPr lang="ko-KR" altLang="en-US" dirty="0">
-                <a:solidFill>
-                  <a:srgbClr val="000000"/>
-                </a:solidFill>
-                <a:latin typeface="맑은 고딕" panose="020B0503020000020004" pitchFamily="50" charset="-127"/>
-                <a:ea typeface="맑은 고딕" panose="020B0503020000020004" pitchFamily="50" charset="-127"/>
-              </a:rPr>
-              <a:t>미</a:t>
-            </a:r>
-            <a:r>
-              <a:rPr lang="ko-KR" altLang="en-US" sz="1800" b="0" i="0" u="none" strike="noStrike" dirty="0">
-                <a:solidFill>
-                  <a:srgbClr val="000000"/>
-                </a:solidFill>
-                <a:effectLst/>
-                <a:latin typeface="맑은 고딕" panose="020B0503020000020004" pitchFamily="50" charset="-127"/>
-                <a:ea typeface="맑은 고딕" panose="020B0503020000020004" pitchFamily="50" charset="-127"/>
-              </a:rPr>
-              <a:t>정</a:t>
-            </a:r>
-            <a:r>
-              <a:rPr lang="en-US" altLang="ko-KR" sz="1800" b="0" i="0" u="none" strike="noStrike" dirty="0">
-                <a:solidFill>
-                  <a:srgbClr val="000000"/>
-                </a:solidFill>
-                <a:effectLst/>
-                <a:latin typeface="맑은 고딕" panose="020B0503020000020004" pitchFamily="50" charset="-127"/>
-                <a:ea typeface="맑은 고딕" panose="020B0503020000020004" pitchFamily="50" charset="-127"/>
-              </a:rPr>
-              <a:t>)</a:t>
+              <a:t>H7=0.06</a:t>
             </a:r>
             <a:r>
               <a:rPr lang="ko-KR" altLang="en-US" dirty="0"/>
               <a:t> </a:t>
             </a:r>
+          </a:p>
+        </p:txBody>
+      </p:sp>
+      <p:pic>
+        <p:nvPicPr>
+          <p:cNvPr id="4" name="그림 3">
+            <a:extLst>
+              <a:ext uri="{FF2B5EF4-FFF2-40B4-BE49-F238E27FC236}">
+                <a16:creationId xmlns:a16="http://schemas.microsoft.com/office/drawing/2014/main" id="{B5845CA7-1DF5-5A37-5497-72796C9422AD}"/>
+              </a:ext>
+            </a:extLst>
+          </p:cNvPr>
+          <p:cNvPicPr>
+            <a:picLocks noChangeAspect="1"/>
+          </p:cNvPicPr>
+          <p:nvPr/>
+        </p:nvPicPr>
+        <p:blipFill>
+          <a:blip r:embed="rId3"/>
+          <a:stretch>
+            <a:fillRect/>
+          </a:stretch>
+        </p:blipFill>
+        <p:spPr>
+          <a:xfrm>
+            <a:off x="6095999" y="1576565"/>
+            <a:ext cx="2975297" cy="5072745"/>
+          </a:xfrm>
+          <a:prstGeom prst="rect">
+            <a:avLst/>
+          </a:prstGeom>
+        </p:spPr>
+      </p:pic>
+      <p:sp>
+        <p:nvSpPr>
+          <p:cNvPr id="6" name="TextBox 5">
+            <a:extLst>
+              <a:ext uri="{FF2B5EF4-FFF2-40B4-BE49-F238E27FC236}">
+                <a16:creationId xmlns:a16="http://schemas.microsoft.com/office/drawing/2014/main" id="{411C5146-A27F-7AEB-831C-0482B77FE65B}"/>
+              </a:ext>
+            </a:extLst>
+          </p:cNvPr>
+          <p:cNvSpPr txBox="1"/>
+          <p:nvPr/>
+        </p:nvSpPr>
+        <p:spPr>
+          <a:xfrm>
+            <a:off x="4306894" y="6131935"/>
+            <a:ext cx="1324402" cy="369332"/>
+          </a:xfrm>
+          <a:prstGeom prst="rect">
+            <a:avLst/>
+          </a:prstGeom>
+          <a:noFill/>
+        </p:spPr>
+        <p:txBody>
+          <a:bodyPr wrap="none" rtlCol="0">
+            <a:spAutoFit/>
+          </a:bodyPr>
+          <a:lstStyle/>
+          <a:p>
+            <a:r>
+              <a:rPr lang="en-US" altLang="ko-KR" dirty="0"/>
+              <a:t>H0=0.0775</a:t>
+            </a:r>
+            <a:endParaRPr lang="ko-KR" altLang="en-US" dirty="0"/>
+          </a:p>
+        </p:txBody>
+      </p:sp>
+      <p:cxnSp>
+        <p:nvCxnSpPr>
+          <p:cNvPr id="10" name="직선 화살표 연결선 9">
+            <a:extLst>
+              <a:ext uri="{FF2B5EF4-FFF2-40B4-BE49-F238E27FC236}">
+                <a16:creationId xmlns:a16="http://schemas.microsoft.com/office/drawing/2014/main" id="{F0AAFF98-DDE3-C295-15F8-B3A123AEDA2A}"/>
+              </a:ext>
+            </a:extLst>
+          </p:cNvPr>
+          <p:cNvCxnSpPr/>
+          <p:nvPr/>
+        </p:nvCxnSpPr>
+        <p:spPr>
+          <a:xfrm>
+            <a:off x="2453640" y="6127354"/>
+            <a:ext cx="0" cy="229450"/>
+          </a:xfrm>
+          <a:prstGeom prst="straightConnector1">
+            <a:avLst/>
+          </a:prstGeom>
+          <a:ln>
+            <a:solidFill>
+              <a:srgbClr val="FF0000"/>
+            </a:solidFill>
+            <a:headEnd type="triangle"/>
+            <a:tailEnd type="triangle"/>
+          </a:ln>
+        </p:spPr>
+        <p:style>
+          <a:lnRef idx="1">
+            <a:schemeClr val="accent1"/>
+          </a:lnRef>
+          <a:fillRef idx="0">
+            <a:schemeClr val="accent1"/>
+          </a:fillRef>
+          <a:effectRef idx="0">
+            <a:schemeClr val="accent1"/>
+          </a:effectRef>
+          <a:fontRef idx="minor">
+            <a:schemeClr val="tx1"/>
+          </a:fontRef>
+        </p:style>
+      </p:cxnSp>
+      <p:sp>
+        <p:nvSpPr>
+          <p:cNvPr id="12" name="TextBox 11">
+            <a:extLst>
+              <a:ext uri="{FF2B5EF4-FFF2-40B4-BE49-F238E27FC236}">
+                <a16:creationId xmlns:a16="http://schemas.microsoft.com/office/drawing/2014/main" id="{21CCF3CF-CEF0-650B-A661-50C46D6A2395}"/>
+              </a:ext>
+            </a:extLst>
+          </p:cNvPr>
+          <p:cNvSpPr txBox="1"/>
+          <p:nvPr/>
+        </p:nvSpPr>
+        <p:spPr>
+          <a:xfrm>
+            <a:off x="2474370" y="6094585"/>
+            <a:ext cx="415498" cy="369332"/>
+          </a:xfrm>
+          <a:prstGeom prst="rect">
+            <a:avLst/>
+          </a:prstGeom>
+          <a:noFill/>
+        </p:spPr>
+        <p:txBody>
+          <a:bodyPr wrap="none" rtlCol="0">
+            <a:spAutoFit/>
+          </a:bodyPr>
+          <a:lstStyle/>
+          <a:p>
+            <a:r>
+              <a:rPr lang="en-US" altLang="ko-KR" dirty="0">
+                <a:latin typeface="Times New Roman" panose="02020603050405020304" pitchFamily="18" charset="0"/>
+                <a:cs typeface="Times New Roman" panose="02020603050405020304" pitchFamily="18" charset="0"/>
+              </a:rPr>
+              <a:t>h0</a:t>
+            </a:r>
+            <a:endParaRPr lang="ko-KR" altLang="en-US" dirty="0">
+              <a:latin typeface="Times New Roman" panose="02020603050405020304" pitchFamily="18" charset="0"/>
+              <a:cs typeface="Times New Roman" panose="02020603050405020304" pitchFamily="18" charset="0"/>
+            </a:endParaRPr>
+          </a:p>
+        </p:txBody>
+      </p:sp>
+      <p:cxnSp>
+        <p:nvCxnSpPr>
+          <p:cNvPr id="16" name="직선 화살표 연결선 15">
+            <a:extLst>
+              <a:ext uri="{FF2B5EF4-FFF2-40B4-BE49-F238E27FC236}">
+                <a16:creationId xmlns:a16="http://schemas.microsoft.com/office/drawing/2014/main" id="{C3052634-469D-5F9E-408B-50A8752ACD65}"/>
+              </a:ext>
+            </a:extLst>
+          </p:cNvPr>
+          <p:cNvCxnSpPr>
+            <a:cxnSpLocks/>
+          </p:cNvCxnSpPr>
+          <p:nvPr/>
+        </p:nvCxnSpPr>
+        <p:spPr>
+          <a:xfrm flipH="1">
+            <a:off x="849346" y="6270565"/>
+            <a:ext cx="251460" cy="184666"/>
+          </a:xfrm>
+          <a:prstGeom prst="straightConnector1">
+            <a:avLst/>
+          </a:prstGeom>
+          <a:ln>
+            <a:solidFill>
+              <a:srgbClr val="FF0000"/>
+            </a:solidFill>
+            <a:tailEnd type="triangle"/>
+          </a:ln>
+        </p:spPr>
+        <p:style>
+          <a:lnRef idx="1">
+            <a:schemeClr val="accent1"/>
+          </a:lnRef>
+          <a:fillRef idx="0">
+            <a:schemeClr val="accent1"/>
+          </a:fillRef>
+          <a:effectRef idx="0">
+            <a:schemeClr val="accent1"/>
+          </a:effectRef>
+          <a:fontRef idx="minor">
+            <a:schemeClr val="tx1"/>
+          </a:fontRef>
+        </p:style>
+      </p:cxnSp>
+      <p:cxnSp>
+        <p:nvCxnSpPr>
+          <p:cNvPr id="18" name="직선 화살표 연결선 17">
+            <a:extLst>
+              <a:ext uri="{FF2B5EF4-FFF2-40B4-BE49-F238E27FC236}">
+                <a16:creationId xmlns:a16="http://schemas.microsoft.com/office/drawing/2014/main" id="{F4D499A1-93FE-7229-AD4C-D36033FBF6FC}"/>
+              </a:ext>
+            </a:extLst>
+          </p:cNvPr>
+          <p:cNvCxnSpPr>
+            <a:cxnSpLocks/>
+          </p:cNvCxnSpPr>
+          <p:nvPr/>
+        </p:nvCxnSpPr>
+        <p:spPr>
+          <a:xfrm>
+            <a:off x="1090495" y="6270565"/>
+            <a:ext cx="289786" cy="0"/>
+          </a:xfrm>
+          <a:prstGeom prst="straightConnector1">
+            <a:avLst/>
+          </a:prstGeom>
+          <a:ln>
+            <a:solidFill>
+              <a:srgbClr val="00B050"/>
+            </a:solidFill>
+            <a:tailEnd type="triangle"/>
+          </a:ln>
+        </p:spPr>
+        <p:style>
+          <a:lnRef idx="1">
+            <a:schemeClr val="accent1"/>
+          </a:lnRef>
+          <a:fillRef idx="0">
+            <a:schemeClr val="accent1"/>
+          </a:fillRef>
+          <a:effectRef idx="0">
+            <a:schemeClr val="accent1"/>
+          </a:effectRef>
+          <a:fontRef idx="minor">
+            <a:schemeClr val="tx1"/>
+          </a:fontRef>
+        </p:style>
+      </p:cxnSp>
+      <p:cxnSp>
+        <p:nvCxnSpPr>
+          <p:cNvPr id="24" name="직선 화살표 연결선 23">
+            <a:extLst>
+              <a:ext uri="{FF2B5EF4-FFF2-40B4-BE49-F238E27FC236}">
+                <a16:creationId xmlns:a16="http://schemas.microsoft.com/office/drawing/2014/main" id="{E79B9CD7-C87F-64C9-407C-EDE5E5B393FA}"/>
+              </a:ext>
+            </a:extLst>
+          </p:cNvPr>
+          <p:cNvCxnSpPr>
+            <a:cxnSpLocks/>
+          </p:cNvCxnSpPr>
+          <p:nvPr/>
+        </p:nvCxnSpPr>
+        <p:spPr>
+          <a:xfrm flipV="1">
+            <a:off x="1100806" y="5984142"/>
+            <a:ext cx="0" cy="286423"/>
+          </a:xfrm>
+          <a:prstGeom prst="straightConnector1">
+            <a:avLst/>
+          </a:prstGeom>
+          <a:ln>
+            <a:solidFill>
+              <a:srgbClr val="0070C0"/>
+            </a:solidFill>
+            <a:tailEnd type="triangle"/>
+          </a:ln>
+        </p:spPr>
+        <p:style>
+          <a:lnRef idx="1">
+            <a:schemeClr val="accent1"/>
+          </a:lnRef>
+          <a:fillRef idx="0">
+            <a:schemeClr val="accent1"/>
+          </a:fillRef>
+          <a:effectRef idx="0">
+            <a:schemeClr val="accent1"/>
+          </a:effectRef>
+          <a:fontRef idx="minor">
+            <a:schemeClr val="tx1"/>
+          </a:fontRef>
+        </p:style>
+      </p:cxnSp>
+      <p:sp>
+        <p:nvSpPr>
+          <p:cNvPr id="44" name="화살표: 아래로 구부러짐 43">
+            <a:extLst>
+              <a:ext uri="{FF2B5EF4-FFF2-40B4-BE49-F238E27FC236}">
+                <a16:creationId xmlns:a16="http://schemas.microsoft.com/office/drawing/2014/main" id="{5FF83BFD-E8DD-591B-6E7B-D4837845D4A9}"/>
+              </a:ext>
+            </a:extLst>
+          </p:cNvPr>
+          <p:cNvSpPr/>
+          <p:nvPr/>
+        </p:nvSpPr>
+        <p:spPr>
+          <a:xfrm rot="10800000">
+            <a:off x="1082824" y="6295226"/>
+            <a:ext cx="772157" cy="307799"/>
+          </a:xfrm>
+          <a:prstGeom prst="curvedDownArrow">
+            <a:avLst>
+              <a:gd name="adj1" fmla="val 12666"/>
+              <a:gd name="adj2" fmla="val 37102"/>
+              <a:gd name="adj3" fmla="val 12113"/>
+            </a:avLst>
+          </a:prstGeom>
+        </p:spPr>
+        <p:style>
+          <a:lnRef idx="2">
+            <a:schemeClr val="accent1">
+              <a:shade val="50000"/>
+            </a:schemeClr>
+          </a:lnRef>
+          <a:fillRef idx="1">
+            <a:schemeClr val="accent1"/>
+          </a:fillRef>
+          <a:effectRef idx="0">
+            <a:schemeClr val="accent1"/>
+          </a:effectRef>
+          <a:fontRef idx="minor">
+            <a:schemeClr val="lt1"/>
+          </a:fontRef>
+        </p:style>
+        <p:txBody>
+          <a:bodyPr rtlCol="0" anchor="ctr"/>
+          <a:lstStyle/>
+          <a:p>
+            <a:pPr algn="ctr"/>
+            <a:endParaRPr lang="ko-KR" altLang="en-US">
+              <a:solidFill>
+                <a:schemeClr val="tx1"/>
+              </a:solidFill>
+            </a:endParaRPr>
           </a:p>
         </p:txBody>
       </p:sp>
@@ -5169,7 +6023,7 @@
 </p:sld>
 </file>
 
-<file path=ppt/slides/slide4.xml><?xml version="1.0" encoding="utf-8"?>
+<file path=ppt/slides/slide5.xml><?xml version="1.0" encoding="utf-8"?>
 <p:sld xmlns:a="http://schemas.openxmlformats.org/drawingml/2006/main" xmlns:r="http://schemas.openxmlformats.org/officeDocument/2006/relationships" xmlns:p="http://schemas.openxmlformats.org/presentationml/2006/main">
   <p:cSld>
     <p:spTree>

</xml_diff>